<commit_message>
Finished the filter realization of the potentiometer and added an optional first order butterworth filter for the mpu6050 for faster response time
</commit_message>
<xml_diff>
--- a/Arduino DSP project/Presentation.pptx
+++ b/Arduino DSP project/Presentation.pptx
@@ -14,6 +14,9 @@
     <p:sldId id="263" r:id="rId8"/>
     <p:sldId id="264" r:id="rId9"/>
     <p:sldId id="265" r:id="rId10"/>
+    <p:sldId id="266" r:id="rId11"/>
+    <p:sldId id="267" r:id="rId12"/>
+    <p:sldId id="268" r:id="rId13"/>
   </p:sldIdLst>
   <p:sldSz cx="12192000" cy="6858000"/>
   <p:notesSz cx="6858000" cy="9144000"/>
@@ -3403,6 +3406,2269 @@
 </p:sld>
 </file>
 
+<file path=ppt/slides/slide10.xml><?xml version="1.0" encoding="utf-8"?>
+<p:sld xmlns:a="http://schemas.openxmlformats.org/drawingml/2006/main" xmlns:r="http://schemas.openxmlformats.org/officeDocument/2006/relationships" xmlns:p="http://schemas.openxmlformats.org/presentationml/2006/main">
+  <p:cSld>
+    <p:spTree>
+      <p:nvGrpSpPr>
+        <p:cNvPr id="1" name=""/>
+        <p:cNvGrpSpPr/>
+        <p:nvPr/>
+      </p:nvGrpSpPr>
+      <p:grpSpPr>
+        <a:xfrm>
+          <a:off x="0" y="0"/>
+          <a:ext cx="0" cy="0"/>
+          <a:chOff x="0" y="0"/>
+          <a:chExt cx="0" cy="0"/>
+        </a:xfrm>
+      </p:grpSpPr>
+      <p:sp>
+        <p:nvSpPr>
+          <p:cNvPr id="2" name="Title 1">
+            <a:extLst>
+              <a:ext uri="{FF2B5EF4-FFF2-40B4-BE49-F238E27FC236}">
+                <a16:creationId xmlns:a16="http://schemas.microsoft.com/office/drawing/2014/main" id="{7F19287B-F271-434C-87CB-6DF210D18D15}"/>
+              </a:ext>
+            </a:extLst>
+          </p:cNvPr>
+          <p:cNvSpPr>
+            <a:spLocks noGrp="1"/>
+          </p:cNvSpPr>
+          <p:nvPr>
+            <p:ph type="title"/>
+          </p:nvPr>
+        </p:nvSpPr>
+        <p:spPr/>
+        <p:txBody>
+          <a:bodyPr/>
+          <a:lstStyle/>
+          <a:p>
+            <a:r>
+              <a:rPr lang="en-US" dirty="0"/>
+              <a:t>Filter Realization</a:t>
+            </a:r>
+          </a:p>
+        </p:txBody>
+      </p:sp>
+      <mc:AlternateContent xmlns:mc="http://schemas.openxmlformats.org/markup-compatibility/2006">
+        <mc:Choice xmlns:a14="http://schemas.microsoft.com/office/drawing/2010/main" Requires="a14">
+          <p:sp>
+            <p:nvSpPr>
+              <p:cNvPr id="3" name="Content Placeholder 2">
+                <a:extLst>
+                  <a:ext uri="{FF2B5EF4-FFF2-40B4-BE49-F238E27FC236}">
+                    <a16:creationId xmlns:a16="http://schemas.microsoft.com/office/drawing/2014/main" id="{FF421BD6-8731-493A-B1A6-B54844DF319D}"/>
+                  </a:ext>
+                </a:extLst>
+              </p:cNvPr>
+              <p:cNvSpPr>
+                <a:spLocks noGrp="1"/>
+              </p:cNvSpPr>
+              <p:nvPr>
+                <p:ph idx="1"/>
+              </p:nvPr>
+            </p:nvSpPr>
+            <p:spPr/>
+            <p:txBody>
+              <a:bodyPr>
+                <a:normAutofit/>
+              </a:bodyPr>
+              <a:lstStyle/>
+              <a:p>
+                <a:pPr marL="0" indent="0">
+                  <a:buNone/>
+                </a:pPr>
+                <a:r>
+                  <a:rPr lang="en-US" sz="2400" dirty="0"/>
+                  <a:t>Now, we will realize the filter for the potentiometer. The filter is first order with a cutoff frequency of </a:t>
+                </a:r>
+                <a14:m>
+                  <m:oMath xmlns:m="http://schemas.openxmlformats.org/officeDocument/2006/math">
+                    <m:r>
+                      <a:rPr lang="en-US" sz="2400" b="0" i="1" smtClean="0">
+                        <a:latin typeface="Cambria Math" panose="02040503050406030204" pitchFamily="18" charset="0"/>
+                      </a:rPr>
+                      <m:t>2</m:t>
+                    </m:r>
+                    <m:r>
+                      <a:rPr lang="en-US" sz="2400" b="0" i="1" smtClean="0">
+                        <a:latin typeface="Cambria Math" panose="02040503050406030204" pitchFamily="18" charset="0"/>
+                      </a:rPr>
+                      <m:t>𝐻𝑧</m:t>
+                    </m:r>
+                  </m:oMath>
+                </a14:m>
+                <a:r>
+                  <a:rPr lang="en-US" sz="2400" dirty="0"/>
+                  <a:t>.</a:t>
+                </a:r>
+              </a:p>
+              <a:p>
+                <a:pPr marL="0" indent="0">
+                  <a:buNone/>
+                </a:pPr>
+                <a:endParaRPr lang="en-US" sz="2400" dirty="0"/>
+              </a:p>
+              <a:p>
+                <a:pPr marL="0" indent="0">
+                  <a:buNone/>
+                </a:pPr>
+                <a14:m>
+                  <m:oMathPara xmlns:m="http://schemas.openxmlformats.org/officeDocument/2006/math">
+                    <m:oMathParaPr>
+                      <m:jc m:val="centerGroup"/>
+                    </m:oMathParaPr>
+                    <m:oMath xmlns:m="http://schemas.openxmlformats.org/officeDocument/2006/math">
+                      <m:r>
+                        <a:rPr lang="en-US" sz="2400" b="0" i="1" smtClean="0">
+                          <a:latin typeface="Cambria Math" panose="02040503050406030204" pitchFamily="18" charset="0"/>
+                        </a:rPr>
+                        <m:t>𝐻</m:t>
+                      </m:r>
+                      <m:d>
+                        <m:dPr>
+                          <m:ctrlPr>
+                            <a:rPr lang="en-US" sz="2400" b="0" i="1" smtClean="0">
+                              <a:latin typeface="Cambria Math" panose="02040503050406030204" pitchFamily="18" charset="0"/>
+                            </a:rPr>
+                          </m:ctrlPr>
+                        </m:dPr>
+                        <m:e>
+                          <m:r>
+                            <a:rPr lang="en-US" sz="2400" b="0" i="1" smtClean="0">
+                              <a:latin typeface="Cambria Math" panose="02040503050406030204" pitchFamily="18" charset="0"/>
+                            </a:rPr>
+                            <m:t>𝑠</m:t>
+                          </m:r>
+                        </m:e>
+                      </m:d>
+                      <m:r>
+                        <a:rPr lang="en-US" sz="2400" b="0" i="1" smtClean="0">
+                          <a:latin typeface="Cambria Math" panose="02040503050406030204" pitchFamily="18" charset="0"/>
+                        </a:rPr>
+                        <m:t>=</m:t>
+                      </m:r>
+                      <m:f>
+                        <m:fPr>
+                          <m:ctrlPr>
+                            <a:rPr lang="en-US" sz="2400" b="0" i="1" smtClean="0">
+                              <a:latin typeface="Cambria Math" panose="02040503050406030204" pitchFamily="18" charset="0"/>
+                            </a:rPr>
+                          </m:ctrlPr>
+                        </m:fPr>
+                        <m:num>
+                          <m:r>
+                            <a:rPr lang="en-US" sz="2400" b="0" i="1" smtClean="0">
+                              <a:latin typeface="Cambria Math" panose="02040503050406030204" pitchFamily="18" charset="0"/>
+                            </a:rPr>
+                            <m:t>1</m:t>
+                          </m:r>
+                        </m:num>
+                        <m:den>
+                          <m:r>
+                            <a:rPr lang="en-US" sz="2400" b="0" i="1" smtClean="0">
+                              <a:latin typeface="Cambria Math" panose="02040503050406030204" pitchFamily="18" charset="0"/>
+                            </a:rPr>
+                            <m:t>𝑠</m:t>
+                          </m:r>
+                          <m:r>
+                            <a:rPr lang="en-US" sz="2400" b="0" i="1" smtClean="0">
+                              <a:latin typeface="Cambria Math" panose="02040503050406030204" pitchFamily="18" charset="0"/>
+                            </a:rPr>
+                            <m:t>+1</m:t>
+                          </m:r>
+                        </m:den>
+                      </m:f>
+                      <m:r>
+                        <a:rPr lang="en-US" sz="2400" b="0" i="1" smtClean="0">
+                          <a:latin typeface="Cambria Math" panose="02040503050406030204" pitchFamily="18" charset="0"/>
+                        </a:rPr>
+                        <m:t>;</m:t>
+                      </m:r>
+                      <m:r>
+                        <a:rPr lang="en-US" sz="2400" b="0" i="1" smtClean="0">
+                          <a:latin typeface="Cambria Math" panose="02040503050406030204" pitchFamily="18" charset="0"/>
+                        </a:rPr>
+                        <m:t>𝑠</m:t>
+                      </m:r>
+                      <m:r>
+                        <a:rPr lang="en-US" sz="2400" b="0" i="1" smtClean="0">
+                          <a:latin typeface="Cambria Math" panose="02040503050406030204" pitchFamily="18" charset="0"/>
+                        </a:rPr>
+                        <m:t>=</m:t>
+                      </m:r>
+                      <m:f>
+                        <m:fPr>
+                          <m:ctrlPr>
+                            <a:rPr lang="en-US" sz="2400" b="0" i="1" smtClean="0">
+                              <a:latin typeface="Cambria Math" panose="02040503050406030204" pitchFamily="18" charset="0"/>
+                            </a:rPr>
+                          </m:ctrlPr>
+                        </m:fPr>
+                        <m:num>
+                          <m:r>
+                            <a:rPr lang="en-US" sz="2400" b="0" i="1" smtClean="0">
+                              <a:latin typeface="Cambria Math" panose="02040503050406030204" pitchFamily="18" charset="0"/>
+                            </a:rPr>
+                            <m:t>𝑠</m:t>
+                          </m:r>
+                        </m:num>
+                        <m:den>
+                          <m:r>
+                            <a:rPr lang="en-US" sz="2400" b="0" i="1" smtClean="0">
+                              <a:latin typeface="Cambria Math" panose="02040503050406030204" pitchFamily="18" charset="0"/>
+                            </a:rPr>
+                            <m:t>2∗2∗</m:t>
+                          </m:r>
+                          <m:r>
+                            <a:rPr lang="en-US" sz="2400" b="0" i="1" smtClean="0">
+                              <a:latin typeface="Cambria Math" panose="02040503050406030204" pitchFamily="18" charset="0"/>
+                            </a:rPr>
+                            <m:t>𝜋</m:t>
+                          </m:r>
+                        </m:den>
+                      </m:f>
+                    </m:oMath>
+                  </m:oMathPara>
+                </a14:m>
+                <a:endParaRPr lang="en-US" sz="2400" dirty="0"/>
+              </a:p>
+              <a:p>
+                <a:pPr marL="0" indent="0">
+                  <a:buNone/>
+                </a:pPr>
+                <a:endParaRPr lang="en-US" sz="2400" dirty="0"/>
+              </a:p>
+              <a:p>
+                <a:pPr marL="0" indent="0">
+                  <a:buNone/>
+                </a:pPr>
+                <a14:m>
+                  <m:oMathPara xmlns:m="http://schemas.openxmlformats.org/officeDocument/2006/math">
+                    <m:oMathParaPr>
+                      <m:jc m:val="centerGroup"/>
+                    </m:oMathParaPr>
+                    <m:oMath xmlns:m="http://schemas.openxmlformats.org/officeDocument/2006/math">
+                      <m:r>
+                        <a:rPr lang="en-US" sz="2400" b="0" i="1" smtClean="0">
+                          <a:latin typeface="Cambria Math" panose="02040503050406030204" pitchFamily="18" charset="0"/>
+                        </a:rPr>
+                        <m:t>𝐻</m:t>
+                      </m:r>
+                      <m:d>
+                        <m:dPr>
+                          <m:ctrlPr>
+                            <a:rPr lang="en-US" sz="2400" b="0" i="1" smtClean="0">
+                              <a:latin typeface="Cambria Math" panose="02040503050406030204" pitchFamily="18" charset="0"/>
+                            </a:rPr>
+                          </m:ctrlPr>
+                        </m:dPr>
+                        <m:e>
+                          <m:r>
+                            <a:rPr lang="en-US" sz="2400" b="0" i="1" smtClean="0">
+                              <a:latin typeface="Cambria Math" panose="02040503050406030204" pitchFamily="18" charset="0"/>
+                            </a:rPr>
+                            <m:t>𝑠</m:t>
+                          </m:r>
+                        </m:e>
+                      </m:d>
+                      <m:r>
+                        <a:rPr lang="en-US" sz="2400" b="0" i="1" smtClean="0">
+                          <a:latin typeface="Cambria Math" panose="02040503050406030204" pitchFamily="18" charset="0"/>
+                        </a:rPr>
+                        <m:t>=</m:t>
+                      </m:r>
+                      <m:f>
+                        <m:fPr>
+                          <m:ctrlPr>
+                            <a:rPr lang="en-US" sz="2400" b="0" i="1" smtClean="0">
+                              <a:latin typeface="Cambria Math" panose="02040503050406030204" pitchFamily="18" charset="0"/>
+                            </a:rPr>
+                          </m:ctrlPr>
+                        </m:fPr>
+                        <m:num>
+                          <m:r>
+                            <a:rPr lang="en-US" sz="2400" b="0" i="1" smtClean="0">
+                              <a:latin typeface="Cambria Math" panose="02040503050406030204" pitchFamily="18" charset="0"/>
+                            </a:rPr>
+                            <m:t>1</m:t>
+                          </m:r>
+                        </m:num>
+                        <m:den>
+                          <m:f>
+                            <m:fPr>
+                              <m:ctrlPr>
+                                <a:rPr lang="en-US" sz="2400" b="0" i="1" smtClean="0">
+                                  <a:latin typeface="Cambria Math" panose="02040503050406030204" pitchFamily="18" charset="0"/>
+                                </a:rPr>
+                              </m:ctrlPr>
+                            </m:fPr>
+                            <m:num>
+                              <m:r>
+                                <a:rPr lang="en-US" sz="2400" b="0" i="1" smtClean="0">
+                                  <a:latin typeface="Cambria Math" panose="02040503050406030204" pitchFamily="18" charset="0"/>
+                                </a:rPr>
+                                <m:t>𝑠</m:t>
+                              </m:r>
+                            </m:num>
+                            <m:den>
+                              <m:r>
+                                <a:rPr lang="en-US" sz="2400" b="0" i="1" smtClean="0">
+                                  <a:latin typeface="Cambria Math" panose="02040503050406030204" pitchFamily="18" charset="0"/>
+                                </a:rPr>
+                                <m:t>4</m:t>
+                              </m:r>
+                              <m:r>
+                                <a:rPr lang="en-US" sz="2400" b="0" i="1" smtClean="0">
+                                  <a:latin typeface="Cambria Math" panose="02040503050406030204" pitchFamily="18" charset="0"/>
+                                </a:rPr>
+                                <m:t>𝜋</m:t>
+                              </m:r>
+                            </m:den>
+                          </m:f>
+                          <m:r>
+                            <a:rPr lang="en-US" sz="2400" b="0" i="1" smtClean="0">
+                              <a:latin typeface="Cambria Math" panose="02040503050406030204" pitchFamily="18" charset="0"/>
+                            </a:rPr>
+                            <m:t>+1</m:t>
+                          </m:r>
+                        </m:den>
+                      </m:f>
+                      <m:r>
+                        <a:rPr lang="en-US" sz="2400" b="0" i="1" smtClean="0">
+                          <a:latin typeface="Cambria Math" panose="02040503050406030204" pitchFamily="18" charset="0"/>
+                        </a:rPr>
+                        <m:t>=</m:t>
+                      </m:r>
+                      <m:f>
+                        <m:fPr>
+                          <m:ctrlPr>
+                            <a:rPr lang="en-US" sz="2400" b="0" i="1" smtClean="0">
+                              <a:latin typeface="Cambria Math" panose="02040503050406030204" pitchFamily="18" charset="0"/>
+                            </a:rPr>
+                          </m:ctrlPr>
+                        </m:fPr>
+                        <m:num>
+                          <m:r>
+                            <a:rPr lang="en-US" sz="2400" b="0" i="1" smtClean="0">
+                              <a:latin typeface="Cambria Math" panose="02040503050406030204" pitchFamily="18" charset="0"/>
+                            </a:rPr>
+                            <m:t>4</m:t>
+                          </m:r>
+                          <m:r>
+                            <a:rPr lang="en-US" sz="2400" b="0" i="1" smtClean="0">
+                              <a:latin typeface="Cambria Math" panose="02040503050406030204" pitchFamily="18" charset="0"/>
+                            </a:rPr>
+                            <m:t>𝜋</m:t>
+                          </m:r>
+                        </m:num>
+                        <m:den>
+                          <m:r>
+                            <a:rPr lang="en-US" sz="2400" b="0" i="1" smtClean="0">
+                              <a:latin typeface="Cambria Math" panose="02040503050406030204" pitchFamily="18" charset="0"/>
+                            </a:rPr>
+                            <m:t>𝑠</m:t>
+                          </m:r>
+                          <m:r>
+                            <a:rPr lang="en-US" sz="2400" b="0" i="1" smtClean="0">
+                              <a:latin typeface="Cambria Math" panose="02040503050406030204" pitchFamily="18" charset="0"/>
+                            </a:rPr>
+                            <m:t>+4</m:t>
+                          </m:r>
+                          <m:r>
+                            <a:rPr lang="en-US" sz="2400" b="0" i="1" smtClean="0">
+                              <a:latin typeface="Cambria Math" panose="02040503050406030204" pitchFamily="18" charset="0"/>
+                            </a:rPr>
+                            <m:t>𝜋</m:t>
+                          </m:r>
+                        </m:den>
+                      </m:f>
+                    </m:oMath>
+                  </m:oMathPara>
+                </a14:m>
+                <a:endParaRPr lang="en-US" sz="2400" dirty="0"/>
+              </a:p>
+              <a:p>
+                <a:pPr marL="0" indent="0">
+                  <a:buNone/>
+                </a:pPr>
+                <a:r>
+                  <a:rPr lang="en-US" sz="2400" dirty="0"/>
+                  <a:t>Now that we obtained the analog filter, we will use the bilinear transform to obtain the filter in the z domain. The sampling frequency </a:t>
+                </a:r>
+                <a14:m>
+                  <m:oMath xmlns:m="http://schemas.openxmlformats.org/officeDocument/2006/math">
+                    <m:r>
+                      <a:rPr lang="en-US" sz="2400" b="0" i="1" smtClean="0">
+                        <a:latin typeface="Cambria Math" panose="02040503050406030204" pitchFamily="18" charset="0"/>
+                      </a:rPr>
+                      <m:t>𝑓𝑠</m:t>
+                    </m:r>
+                    <m:r>
+                      <a:rPr lang="en-US" sz="2400" b="0" i="1" smtClean="0">
+                        <a:latin typeface="Cambria Math" panose="02040503050406030204" pitchFamily="18" charset="0"/>
+                      </a:rPr>
+                      <m:t>=1000</m:t>
+                    </m:r>
+                    <m:r>
+                      <a:rPr lang="en-US" sz="2400" b="0" i="1" smtClean="0">
+                        <a:latin typeface="Cambria Math" panose="02040503050406030204" pitchFamily="18" charset="0"/>
+                      </a:rPr>
+                      <m:t>𝐻𝑧</m:t>
+                    </m:r>
+                  </m:oMath>
+                </a14:m>
+                <a:r>
+                  <a:rPr lang="en-US" sz="2400" dirty="0"/>
+                  <a:t>.</a:t>
+                </a:r>
+              </a:p>
+            </p:txBody>
+          </p:sp>
+        </mc:Choice>
+        <mc:Fallback>
+          <p:sp>
+            <p:nvSpPr>
+              <p:cNvPr id="3" name="Content Placeholder 2">
+                <a:extLst>
+                  <a:ext uri="{FF2B5EF4-FFF2-40B4-BE49-F238E27FC236}">
+                    <a16:creationId xmlns:a16="http://schemas.microsoft.com/office/drawing/2014/main" id="{FF421BD6-8731-493A-B1A6-B54844DF319D}"/>
+                  </a:ext>
+                </a:extLst>
+              </p:cNvPr>
+              <p:cNvSpPr>
+                <a:spLocks noGrp="1" noRot="1" noChangeAspect="1" noMove="1" noResize="1" noEditPoints="1" noAdjustHandles="1" noChangeArrowheads="1" noChangeShapeType="1" noTextEdit="1"/>
+              </p:cNvSpPr>
+              <p:nvPr>
+                <p:ph idx="1"/>
+              </p:nvPr>
+            </p:nvSpPr>
+            <p:spPr>
+              <a:blipFill>
+                <a:blip r:embed="rId2"/>
+                <a:stretch>
+                  <a:fillRect l="-928" t="-1961" r="-638"/>
+                </a:stretch>
+              </a:blipFill>
+            </p:spPr>
+            <p:txBody>
+              <a:bodyPr/>
+              <a:lstStyle/>
+              <a:p>
+                <a:r>
+                  <a:rPr lang="en-US">
+                    <a:noFill/>
+                  </a:rPr>
+                  <a:t> </a:t>
+                </a:r>
+              </a:p>
+            </p:txBody>
+          </p:sp>
+        </mc:Fallback>
+      </mc:AlternateContent>
+    </p:spTree>
+    <p:extLst>
+      <p:ext uri="{BB962C8B-B14F-4D97-AF65-F5344CB8AC3E}">
+        <p14:creationId xmlns:p14="http://schemas.microsoft.com/office/powerpoint/2010/main" val="1887839103"/>
+      </p:ext>
+    </p:extLst>
+  </p:cSld>
+  <p:clrMapOvr>
+    <a:masterClrMapping/>
+  </p:clrMapOvr>
+</p:sld>
+</file>
+
+<file path=ppt/slides/slide11.xml><?xml version="1.0" encoding="utf-8"?>
+<p:sld xmlns:a="http://schemas.openxmlformats.org/drawingml/2006/main" xmlns:r="http://schemas.openxmlformats.org/officeDocument/2006/relationships" xmlns:p="http://schemas.openxmlformats.org/presentationml/2006/main">
+  <p:cSld>
+    <p:spTree>
+      <p:nvGrpSpPr>
+        <p:cNvPr id="1" name=""/>
+        <p:cNvGrpSpPr/>
+        <p:nvPr/>
+      </p:nvGrpSpPr>
+      <p:grpSpPr>
+        <a:xfrm>
+          <a:off x="0" y="0"/>
+          <a:ext cx="0" cy="0"/>
+          <a:chOff x="0" y="0"/>
+          <a:chExt cx="0" cy="0"/>
+        </a:xfrm>
+      </p:grpSpPr>
+      <p:sp>
+        <p:nvSpPr>
+          <p:cNvPr id="2" name="Title 1">
+            <a:extLst>
+              <a:ext uri="{FF2B5EF4-FFF2-40B4-BE49-F238E27FC236}">
+                <a16:creationId xmlns:a16="http://schemas.microsoft.com/office/drawing/2014/main" id="{248F318B-6D24-47EA-A4FA-BB3D4C2AB29F}"/>
+              </a:ext>
+            </a:extLst>
+          </p:cNvPr>
+          <p:cNvSpPr>
+            <a:spLocks noGrp="1"/>
+          </p:cNvSpPr>
+          <p:nvPr>
+            <p:ph type="title"/>
+          </p:nvPr>
+        </p:nvSpPr>
+        <p:spPr/>
+        <p:txBody>
+          <a:bodyPr/>
+          <a:lstStyle/>
+          <a:p>
+            <a:r>
+              <a:rPr lang="en-US" dirty="0"/>
+              <a:t>Filter Realization</a:t>
+            </a:r>
+          </a:p>
+        </p:txBody>
+      </p:sp>
+      <mc:AlternateContent xmlns:mc="http://schemas.openxmlformats.org/markup-compatibility/2006">
+        <mc:Choice xmlns:a14="http://schemas.microsoft.com/office/drawing/2010/main" Requires="a14">
+          <p:sp>
+            <p:nvSpPr>
+              <p:cNvPr id="3" name="Content Placeholder 2">
+                <a:extLst>
+                  <a:ext uri="{FF2B5EF4-FFF2-40B4-BE49-F238E27FC236}">
+                    <a16:creationId xmlns:a16="http://schemas.microsoft.com/office/drawing/2014/main" id="{53EDD516-EC11-4014-B44B-FDE1EBF6335A}"/>
+                  </a:ext>
+                </a:extLst>
+              </p:cNvPr>
+              <p:cNvSpPr>
+                <a:spLocks noGrp="1"/>
+              </p:cNvSpPr>
+              <p:nvPr>
+                <p:ph idx="1"/>
+              </p:nvPr>
+            </p:nvSpPr>
+            <p:spPr/>
+            <p:txBody>
+              <a:bodyPr>
+                <a:normAutofit lnSpcReduction="10000"/>
+              </a:bodyPr>
+              <a:lstStyle/>
+              <a:p>
+                <a:pPr marL="0" indent="0">
+                  <a:buNone/>
+                </a:pPr>
+                <a14:m>
+                  <m:oMathPara xmlns:m="http://schemas.openxmlformats.org/officeDocument/2006/math">
+                    <m:oMathParaPr>
+                      <m:jc m:val="centerGroup"/>
+                    </m:oMathParaPr>
+                    <m:oMath xmlns:m="http://schemas.openxmlformats.org/officeDocument/2006/math">
+                      <m:r>
+                        <a:rPr lang="en-US" sz="2400" b="0" i="1" smtClean="0">
+                          <a:latin typeface="Cambria Math" panose="02040503050406030204" pitchFamily="18" charset="0"/>
+                        </a:rPr>
+                        <m:t>𝐻</m:t>
+                      </m:r>
+                      <m:d>
+                        <m:dPr>
+                          <m:ctrlPr>
+                            <a:rPr lang="en-US" sz="2400" b="0" i="1" smtClean="0">
+                              <a:latin typeface="Cambria Math" panose="02040503050406030204" pitchFamily="18" charset="0"/>
+                            </a:rPr>
+                          </m:ctrlPr>
+                        </m:dPr>
+                        <m:e>
+                          <m:r>
+                            <a:rPr lang="en-US" sz="2400" b="0" i="1" smtClean="0">
+                              <a:latin typeface="Cambria Math" panose="02040503050406030204" pitchFamily="18" charset="0"/>
+                            </a:rPr>
+                            <m:t>𝑧</m:t>
+                          </m:r>
+                        </m:e>
+                      </m:d>
+                      <m:r>
+                        <a:rPr lang="en-US" sz="2400" b="0" i="1" smtClean="0">
+                          <a:latin typeface="Cambria Math" panose="02040503050406030204" pitchFamily="18" charset="0"/>
+                        </a:rPr>
+                        <m:t>=</m:t>
+                      </m:r>
+                      <m:f>
+                        <m:fPr>
+                          <m:ctrlPr>
+                            <a:rPr lang="en-US" sz="2400" b="0" i="1" smtClean="0">
+                              <a:latin typeface="Cambria Math" panose="02040503050406030204" pitchFamily="18" charset="0"/>
+                            </a:rPr>
+                          </m:ctrlPr>
+                        </m:fPr>
+                        <m:num>
+                          <m:r>
+                            <a:rPr lang="en-US" sz="2400" b="0" i="1" smtClean="0">
+                              <a:latin typeface="Cambria Math" panose="02040503050406030204" pitchFamily="18" charset="0"/>
+                            </a:rPr>
+                            <m:t>4</m:t>
+                          </m:r>
+                          <m:r>
+                            <a:rPr lang="en-US" sz="2400" b="0" i="1" smtClean="0">
+                              <a:latin typeface="Cambria Math" panose="02040503050406030204" pitchFamily="18" charset="0"/>
+                            </a:rPr>
+                            <m:t>𝜋</m:t>
+                          </m:r>
+                        </m:num>
+                        <m:den>
+                          <m:r>
+                            <a:rPr lang="en-US" sz="2400" b="0" i="1" smtClean="0">
+                              <a:latin typeface="Cambria Math" panose="02040503050406030204" pitchFamily="18" charset="0"/>
+                            </a:rPr>
+                            <m:t>𝑠</m:t>
+                          </m:r>
+                          <m:r>
+                            <a:rPr lang="en-US" sz="2400" b="0" i="1" smtClean="0">
+                              <a:latin typeface="Cambria Math" panose="02040503050406030204" pitchFamily="18" charset="0"/>
+                            </a:rPr>
+                            <m:t>+4</m:t>
+                          </m:r>
+                          <m:r>
+                            <a:rPr lang="en-US" sz="2400" b="0" i="1" smtClean="0">
+                              <a:latin typeface="Cambria Math" panose="02040503050406030204" pitchFamily="18" charset="0"/>
+                            </a:rPr>
+                            <m:t>𝜋</m:t>
+                          </m:r>
+                        </m:den>
+                      </m:f>
+                      <m:r>
+                        <a:rPr lang="en-US" sz="2400" b="0" i="1" smtClean="0">
+                          <a:latin typeface="Cambria Math" panose="02040503050406030204" pitchFamily="18" charset="0"/>
+                        </a:rPr>
+                        <m:t>;</m:t>
+                      </m:r>
+                      <m:r>
+                        <a:rPr lang="en-US" sz="2400" b="0" i="1" smtClean="0">
+                          <a:latin typeface="Cambria Math" panose="02040503050406030204" pitchFamily="18" charset="0"/>
+                        </a:rPr>
+                        <m:t>𝑠</m:t>
+                      </m:r>
+                      <m:r>
+                        <a:rPr lang="en-US" sz="2400" b="0" i="1" smtClean="0">
+                          <a:latin typeface="Cambria Math" panose="02040503050406030204" pitchFamily="18" charset="0"/>
+                        </a:rPr>
+                        <m:t>=2∗1000∗</m:t>
+                      </m:r>
+                      <m:f>
+                        <m:fPr>
+                          <m:ctrlPr>
+                            <a:rPr lang="en-US" sz="2400" b="0" i="1" smtClean="0">
+                              <a:latin typeface="Cambria Math" panose="02040503050406030204" pitchFamily="18" charset="0"/>
+                            </a:rPr>
+                          </m:ctrlPr>
+                        </m:fPr>
+                        <m:num>
+                          <m:r>
+                            <a:rPr lang="en-US" sz="2400" b="0" i="1" smtClean="0">
+                              <a:latin typeface="Cambria Math" panose="02040503050406030204" pitchFamily="18" charset="0"/>
+                            </a:rPr>
+                            <m:t>𝑧</m:t>
+                          </m:r>
+                          <m:r>
+                            <a:rPr lang="en-US" sz="2400" b="0" i="1" smtClean="0">
+                              <a:latin typeface="Cambria Math" panose="02040503050406030204" pitchFamily="18" charset="0"/>
+                            </a:rPr>
+                            <m:t>−1</m:t>
+                          </m:r>
+                        </m:num>
+                        <m:den>
+                          <m:r>
+                            <a:rPr lang="en-US" sz="2400" b="0" i="1" smtClean="0">
+                              <a:latin typeface="Cambria Math" panose="02040503050406030204" pitchFamily="18" charset="0"/>
+                            </a:rPr>
+                            <m:t>𝑧</m:t>
+                          </m:r>
+                          <m:r>
+                            <a:rPr lang="en-US" sz="2400" b="0" i="1" smtClean="0">
+                              <a:latin typeface="Cambria Math" panose="02040503050406030204" pitchFamily="18" charset="0"/>
+                            </a:rPr>
+                            <m:t>+1</m:t>
+                          </m:r>
+                        </m:den>
+                      </m:f>
+                    </m:oMath>
+                  </m:oMathPara>
+                </a14:m>
+                <a:endParaRPr lang="en-US" sz="2400" b="0" dirty="0"/>
+              </a:p>
+              <a:p>
+                <a:pPr marL="0" indent="0">
+                  <a:buNone/>
+                </a:pPr>
+                <a:endParaRPr lang="en-US" sz="2400" dirty="0"/>
+              </a:p>
+              <a:p>
+                <a:pPr marL="0" indent="0">
+                  <a:buNone/>
+                </a:pPr>
+                <a14:m>
+                  <m:oMathPara xmlns:m="http://schemas.openxmlformats.org/officeDocument/2006/math">
+                    <m:oMathParaPr>
+                      <m:jc m:val="centerGroup"/>
+                    </m:oMathParaPr>
+                    <m:oMath xmlns:m="http://schemas.openxmlformats.org/officeDocument/2006/math">
+                      <m:r>
+                        <a:rPr lang="en-US" sz="2400" b="0" i="1" smtClean="0">
+                          <a:latin typeface="Cambria Math" panose="02040503050406030204" pitchFamily="18" charset="0"/>
+                        </a:rPr>
+                        <m:t>𝐻</m:t>
+                      </m:r>
+                      <m:d>
+                        <m:dPr>
+                          <m:ctrlPr>
+                            <a:rPr lang="en-US" sz="2400" b="0" i="1" smtClean="0">
+                              <a:latin typeface="Cambria Math" panose="02040503050406030204" pitchFamily="18" charset="0"/>
+                            </a:rPr>
+                          </m:ctrlPr>
+                        </m:dPr>
+                        <m:e>
+                          <m:r>
+                            <a:rPr lang="en-US" sz="2400" b="0" i="1" smtClean="0">
+                              <a:latin typeface="Cambria Math" panose="02040503050406030204" pitchFamily="18" charset="0"/>
+                            </a:rPr>
+                            <m:t>𝑧</m:t>
+                          </m:r>
+                        </m:e>
+                      </m:d>
+                      <m:r>
+                        <a:rPr lang="en-US" sz="2400" b="0" i="1" smtClean="0">
+                          <a:latin typeface="Cambria Math" panose="02040503050406030204" pitchFamily="18" charset="0"/>
+                        </a:rPr>
+                        <m:t>=</m:t>
+                      </m:r>
+                      <m:f>
+                        <m:fPr>
+                          <m:ctrlPr>
+                            <a:rPr lang="en-US" sz="2400" b="0" i="1" smtClean="0">
+                              <a:latin typeface="Cambria Math" panose="02040503050406030204" pitchFamily="18" charset="0"/>
+                            </a:rPr>
+                          </m:ctrlPr>
+                        </m:fPr>
+                        <m:num>
+                          <m:r>
+                            <a:rPr lang="en-US" sz="2400" b="0" i="1" smtClean="0">
+                              <a:latin typeface="Cambria Math" panose="02040503050406030204" pitchFamily="18" charset="0"/>
+                            </a:rPr>
+                            <m:t>4</m:t>
+                          </m:r>
+                          <m:r>
+                            <a:rPr lang="en-US" sz="2400" b="0" i="1" smtClean="0">
+                              <a:latin typeface="Cambria Math" panose="02040503050406030204" pitchFamily="18" charset="0"/>
+                            </a:rPr>
+                            <m:t>𝜋</m:t>
+                          </m:r>
+                        </m:num>
+                        <m:den>
+                          <m:f>
+                            <m:fPr>
+                              <m:ctrlPr>
+                                <a:rPr lang="en-US" sz="2400" b="0" i="1" smtClean="0">
+                                  <a:latin typeface="Cambria Math" panose="02040503050406030204" pitchFamily="18" charset="0"/>
+                                </a:rPr>
+                              </m:ctrlPr>
+                            </m:fPr>
+                            <m:num>
+                              <m:r>
+                                <a:rPr lang="en-US" sz="2400" b="0" i="1" smtClean="0">
+                                  <a:latin typeface="Cambria Math" panose="02040503050406030204" pitchFamily="18" charset="0"/>
+                                </a:rPr>
+                                <m:t>2000</m:t>
+                              </m:r>
+                              <m:d>
+                                <m:dPr>
+                                  <m:ctrlPr>
+                                    <a:rPr lang="en-US" sz="2400" b="0" i="1" smtClean="0">
+                                      <a:latin typeface="Cambria Math" panose="02040503050406030204" pitchFamily="18" charset="0"/>
+                                    </a:rPr>
+                                  </m:ctrlPr>
+                                </m:dPr>
+                                <m:e>
+                                  <m:r>
+                                    <a:rPr lang="en-US" sz="2400" b="0" i="1" smtClean="0">
+                                      <a:latin typeface="Cambria Math" panose="02040503050406030204" pitchFamily="18" charset="0"/>
+                                    </a:rPr>
+                                    <m:t>𝑧</m:t>
+                                  </m:r>
+                                  <m:r>
+                                    <a:rPr lang="en-US" sz="2400" b="0" i="1" smtClean="0">
+                                      <a:latin typeface="Cambria Math" panose="02040503050406030204" pitchFamily="18" charset="0"/>
+                                    </a:rPr>
+                                    <m:t>−1</m:t>
+                                  </m:r>
+                                </m:e>
+                              </m:d>
+                            </m:num>
+                            <m:den>
+                              <m:r>
+                                <a:rPr lang="en-US" sz="2400" b="0" i="1" smtClean="0">
+                                  <a:latin typeface="Cambria Math" panose="02040503050406030204" pitchFamily="18" charset="0"/>
+                                </a:rPr>
+                                <m:t>𝑧</m:t>
+                              </m:r>
+                              <m:r>
+                                <a:rPr lang="en-US" sz="2400" b="0" i="1" smtClean="0">
+                                  <a:latin typeface="Cambria Math" panose="02040503050406030204" pitchFamily="18" charset="0"/>
+                                </a:rPr>
+                                <m:t>+1</m:t>
+                              </m:r>
+                            </m:den>
+                          </m:f>
+                          <m:r>
+                            <a:rPr lang="en-US" sz="2400" b="0" i="1" smtClean="0">
+                              <a:latin typeface="Cambria Math" panose="02040503050406030204" pitchFamily="18" charset="0"/>
+                            </a:rPr>
+                            <m:t>+4</m:t>
+                          </m:r>
+                          <m:r>
+                            <a:rPr lang="en-US" sz="2400" b="0" i="1" smtClean="0">
+                              <a:latin typeface="Cambria Math" panose="02040503050406030204" pitchFamily="18" charset="0"/>
+                            </a:rPr>
+                            <m:t>𝜋</m:t>
+                          </m:r>
+                        </m:den>
+                      </m:f>
+                      <m:r>
+                        <a:rPr lang="en-US" sz="2400" b="0" i="1" smtClean="0">
+                          <a:latin typeface="Cambria Math" panose="02040503050406030204" pitchFamily="18" charset="0"/>
+                        </a:rPr>
+                        <m:t>=</m:t>
+                      </m:r>
+                      <m:f>
+                        <m:fPr>
+                          <m:ctrlPr>
+                            <a:rPr lang="en-US" sz="2400" b="0" i="1" smtClean="0">
+                              <a:latin typeface="Cambria Math" panose="02040503050406030204" pitchFamily="18" charset="0"/>
+                            </a:rPr>
+                          </m:ctrlPr>
+                        </m:fPr>
+                        <m:num>
+                          <m:r>
+                            <a:rPr lang="en-US" sz="2400" b="0" i="1" smtClean="0">
+                              <a:latin typeface="Cambria Math" panose="02040503050406030204" pitchFamily="18" charset="0"/>
+                            </a:rPr>
+                            <m:t>4</m:t>
+                          </m:r>
+                          <m:r>
+                            <a:rPr lang="en-US" sz="2400" b="0" i="1" smtClean="0">
+                              <a:latin typeface="Cambria Math" panose="02040503050406030204" pitchFamily="18" charset="0"/>
+                            </a:rPr>
+                            <m:t>𝜋</m:t>
+                          </m:r>
+                          <m:r>
+                            <a:rPr lang="en-US" sz="2400" b="0" i="1" smtClean="0">
+                              <a:latin typeface="Cambria Math" panose="02040503050406030204" pitchFamily="18" charset="0"/>
+                            </a:rPr>
+                            <m:t>(</m:t>
+                          </m:r>
+                          <m:r>
+                            <a:rPr lang="en-US" sz="2400" b="0" i="1" smtClean="0">
+                              <a:latin typeface="Cambria Math" panose="02040503050406030204" pitchFamily="18" charset="0"/>
+                            </a:rPr>
+                            <m:t>𝑧</m:t>
+                          </m:r>
+                          <m:r>
+                            <a:rPr lang="en-US" sz="2400" b="0" i="1" smtClean="0">
+                              <a:latin typeface="Cambria Math" panose="02040503050406030204" pitchFamily="18" charset="0"/>
+                            </a:rPr>
+                            <m:t>+1)</m:t>
+                          </m:r>
+                        </m:num>
+                        <m:den>
+                          <m:r>
+                            <a:rPr lang="en-US" sz="2400" b="0" i="1" smtClean="0">
+                              <a:latin typeface="Cambria Math" panose="02040503050406030204" pitchFamily="18" charset="0"/>
+                            </a:rPr>
+                            <m:t>2000</m:t>
+                          </m:r>
+                          <m:d>
+                            <m:dPr>
+                              <m:ctrlPr>
+                                <a:rPr lang="en-US" sz="2400" b="0" i="1" smtClean="0">
+                                  <a:latin typeface="Cambria Math" panose="02040503050406030204" pitchFamily="18" charset="0"/>
+                                </a:rPr>
+                              </m:ctrlPr>
+                            </m:dPr>
+                            <m:e>
+                              <m:r>
+                                <a:rPr lang="en-US" sz="2400" b="0" i="1" smtClean="0">
+                                  <a:latin typeface="Cambria Math" panose="02040503050406030204" pitchFamily="18" charset="0"/>
+                                </a:rPr>
+                                <m:t>𝑧</m:t>
+                              </m:r>
+                              <m:r>
+                                <a:rPr lang="en-US" sz="2400" b="0" i="1" smtClean="0">
+                                  <a:latin typeface="Cambria Math" panose="02040503050406030204" pitchFamily="18" charset="0"/>
+                                </a:rPr>
+                                <m:t>−1</m:t>
+                              </m:r>
+                            </m:e>
+                          </m:d>
+                          <m:r>
+                            <a:rPr lang="en-US" sz="2400" b="0" i="1" smtClean="0">
+                              <a:latin typeface="Cambria Math" panose="02040503050406030204" pitchFamily="18" charset="0"/>
+                            </a:rPr>
+                            <m:t>+4</m:t>
+                          </m:r>
+                          <m:r>
+                            <a:rPr lang="en-US" sz="2400" b="0" i="1" smtClean="0">
+                              <a:latin typeface="Cambria Math" panose="02040503050406030204" pitchFamily="18" charset="0"/>
+                            </a:rPr>
+                            <m:t>𝜋</m:t>
+                          </m:r>
+                          <m:r>
+                            <a:rPr lang="en-US" sz="2400" b="0" i="1" smtClean="0">
+                              <a:latin typeface="Cambria Math" panose="02040503050406030204" pitchFamily="18" charset="0"/>
+                            </a:rPr>
+                            <m:t>(</m:t>
+                          </m:r>
+                          <m:r>
+                            <a:rPr lang="en-US" sz="2400" b="0" i="1" smtClean="0">
+                              <a:latin typeface="Cambria Math" panose="02040503050406030204" pitchFamily="18" charset="0"/>
+                            </a:rPr>
+                            <m:t>𝑧</m:t>
+                          </m:r>
+                          <m:r>
+                            <a:rPr lang="en-US" sz="2400" b="0" i="1" smtClean="0">
+                              <a:latin typeface="Cambria Math" panose="02040503050406030204" pitchFamily="18" charset="0"/>
+                            </a:rPr>
+                            <m:t>+1)</m:t>
+                          </m:r>
+                        </m:den>
+                      </m:f>
+                    </m:oMath>
+                  </m:oMathPara>
+                </a14:m>
+                <a:endParaRPr lang="en-US" sz="2400" dirty="0"/>
+              </a:p>
+              <a:p>
+                <a:pPr marL="0" indent="0">
+                  <a:buNone/>
+                </a:pPr>
+                <a:endParaRPr lang="en-US" sz="2400" dirty="0"/>
+              </a:p>
+              <a:p>
+                <a:pPr marL="0" indent="0">
+                  <a:buNone/>
+                </a:pPr>
+                <a14:m>
+                  <m:oMathPara xmlns:m="http://schemas.openxmlformats.org/officeDocument/2006/math">
+                    <m:oMathParaPr>
+                      <m:jc m:val="centerGroup"/>
+                    </m:oMathParaPr>
+                    <m:oMath xmlns:m="http://schemas.openxmlformats.org/officeDocument/2006/math">
+                      <m:r>
+                        <a:rPr lang="en-US" sz="2400" b="0" i="1" smtClean="0">
+                          <a:latin typeface="Cambria Math" panose="02040503050406030204" pitchFamily="18" charset="0"/>
+                        </a:rPr>
+                        <m:t>𝐻</m:t>
+                      </m:r>
+                      <m:d>
+                        <m:dPr>
+                          <m:ctrlPr>
+                            <a:rPr lang="en-US" sz="2400" b="0" i="1" smtClean="0">
+                              <a:latin typeface="Cambria Math" panose="02040503050406030204" pitchFamily="18" charset="0"/>
+                            </a:rPr>
+                          </m:ctrlPr>
+                        </m:dPr>
+                        <m:e>
+                          <m:r>
+                            <a:rPr lang="en-US" sz="2400" b="0" i="1" smtClean="0">
+                              <a:latin typeface="Cambria Math" panose="02040503050406030204" pitchFamily="18" charset="0"/>
+                            </a:rPr>
+                            <m:t>𝑧</m:t>
+                          </m:r>
+                        </m:e>
+                      </m:d>
+                      <m:r>
+                        <a:rPr lang="en-US" sz="2400" b="0" i="1" smtClean="0">
+                          <a:latin typeface="Cambria Math" panose="02040503050406030204" pitchFamily="18" charset="0"/>
+                        </a:rPr>
+                        <m:t>=</m:t>
+                      </m:r>
+                      <m:f>
+                        <m:fPr>
+                          <m:ctrlPr>
+                            <a:rPr lang="en-US" sz="2400" b="0" i="1" smtClean="0">
+                              <a:latin typeface="Cambria Math" panose="02040503050406030204" pitchFamily="18" charset="0"/>
+                            </a:rPr>
+                          </m:ctrlPr>
+                        </m:fPr>
+                        <m:num>
+                          <m:r>
+                            <a:rPr lang="en-US" sz="2400" b="0" i="1" smtClean="0">
+                              <a:latin typeface="Cambria Math" panose="02040503050406030204" pitchFamily="18" charset="0"/>
+                            </a:rPr>
+                            <m:t>4</m:t>
+                          </m:r>
+                          <m:r>
+                            <a:rPr lang="en-US" sz="2400" b="0" i="1" smtClean="0">
+                              <a:latin typeface="Cambria Math" panose="02040503050406030204" pitchFamily="18" charset="0"/>
+                            </a:rPr>
+                            <m:t>𝜋</m:t>
+                          </m:r>
+                          <m:r>
+                            <a:rPr lang="en-US" sz="2400" b="0" i="1" smtClean="0">
+                              <a:latin typeface="Cambria Math" panose="02040503050406030204" pitchFamily="18" charset="0"/>
+                            </a:rPr>
+                            <m:t>(</m:t>
+                          </m:r>
+                          <m:r>
+                            <a:rPr lang="en-US" sz="2400" b="0" i="1" smtClean="0">
+                              <a:latin typeface="Cambria Math" panose="02040503050406030204" pitchFamily="18" charset="0"/>
+                            </a:rPr>
+                            <m:t>𝑧</m:t>
+                          </m:r>
+                          <m:r>
+                            <a:rPr lang="en-US" sz="2400" b="0" i="1" smtClean="0">
+                              <a:latin typeface="Cambria Math" panose="02040503050406030204" pitchFamily="18" charset="0"/>
+                            </a:rPr>
+                            <m:t>+1)</m:t>
+                          </m:r>
+                        </m:num>
+                        <m:den>
+                          <m:r>
+                            <a:rPr lang="en-US" sz="2400" b="0" i="1" smtClean="0">
+                              <a:latin typeface="Cambria Math" panose="02040503050406030204" pitchFamily="18" charset="0"/>
+                            </a:rPr>
+                            <m:t>𝑧</m:t>
+                          </m:r>
+                          <m:d>
+                            <m:dPr>
+                              <m:ctrlPr>
+                                <a:rPr lang="en-US" sz="2400" b="0" i="1" smtClean="0">
+                                  <a:latin typeface="Cambria Math" panose="02040503050406030204" pitchFamily="18" charset="0"/>
+                                </a:rPr>
+                              </m:ctrlPr>
+                            </m:dPr>
+                            <m:e>
+                              <m:r>
+                                <a:rPr lang="en-US" sz="2400" b="0" i="1" smtClean="0">
+                                  <a:latin typeface="Cambria Math" panose="02040503050406030204" pitchFamily="18" charset="0"/>
+                                </a:rPr>
+                                <m:t>2000+4</m:t>
+                              </m:r>
+                              <m:r>
+                                <a:rPr lang="en-US" sz="2400" b="0" i="1" smtClean="0">
+                                  <a:latin typeface="Cambria Math" panose="02040503050406030204" pitchFamily="18" charset="0"/>
+                                </a:rPr>
+                                <m:t>𝜋</m:t>
+                              </m:r>
+                            </m:e>
+                          </m:d>
+                          <m:r>
+                            <a:rPr lang="en-US" sz="2400" b="0" i="1" smtClean="0">
+                              <a:latin typeface="Cambria Math" panose="02040503050406030204" pitchFamily="18" charset="0"/>
+                            </a:rPr>
+                            <m:t>+(−2000+4</m:t>
+                          </m:r>
+                          <m:r>
+                            <a:rPr lang="en-US" sz="2400" b="0" i="1" smtClean="0">
+                              <a:latin typeface="Cambria Math" panose="02040503050406030204" pitchFamily="18" charset="0"/>
+                            </a:rPr>
+                            <m:t>𝜋</m:t>
+                          </m:r>
+                          <m:r>
+                            <a:rPr lang="en-US" sz="2400" b="0" i="1" smtClean="0">
+                              <a:latin typeface="Cambria Math" panose="02040503050406030204" pitchFamily="18" charset="0"/>
+                            </a:rPr>
+                            <m:t>)</m:t>
+                          </m:r>
+                        </m:den>
+                      </m:f>
+                    </m:oMath>
+                  </m:oMathPara>
+                </a14:m>
+                <a:endParaRPr lang="en-US" sz="2400" dirty="0"/>
+              </a:p>
+              <a:p>
+                <a:pPr marL="0" indent="0">
+                  <a:buNone/>
+                </a:pPr>
+                <a:endParaRPr lang="en-US" sz="2400" dirty="0"/>
+              </a:p>
+              <a:p>
+                <a:pPr marL="0" indent="0">
+                  <a:buNone/>
+                </a:pPr>
+                <a14:m>
+                  <m:oMathPara xmlns:m="http://schemas.openxmlformats.org/officeDocument/2006/math">
+                    <m:oMathParaPr>
+                      <m:jc m:val="centerGroup"/>
+                    </m:oMathParaPr>
+                    <m:oMath xmlns:m="http://schemas.openxmlformats.org/officeDocument/2006/math">
+                      <m:f>
+                        <m:fPr>
+                          <m:ctrlPr>
+                            <a:rPr lang="en-US" sz="2400" b="0" i="1" smtClean="0">
+                              <a:latin typeface="Cambria Math" panose="02040503050406030204" pitchFamily="18" charset="0"/>
+                            </a:rPr>
+                          </m:ctrlPr>
+                        </m:fPr>
+                        <m:num>
+                          <m:r>
+                            <a:rPr lang="en-US" sz="2400" b="0" i="1" smtClean="0">
+                              <a:latin typeface="Cambria Math" panose="02040503050406030204" pitchFamily="18" charset="0"/>
+                            </a:rPr>
+                            <m:t>𝑌</m:t>
+                          </m:r>
+                          <m:d>
+                            <m:dPr>
+                              <m:ctrlPr>
+                                <a:rPr lang="en-US" sz="2400" b="0" i="1" smtClean="0">
+                                  <a:latin typeface="Cambria Math" panose="02040503050406030204" pitchFamily="18" charset="0"/>
+                                </a:rPr>
+                              </m:ctrlPr>
+                            </m:dPr>
+                            <m:e>
+                              <m:r>
+                                <a:rPr lang="en-US" sz="2400" b="0" i="1" smtClean="0">
+                                  <a:latin typeface="Cambria Math" panose="02040503050406030204" pitchFamily="18" charset="0"/>
+                                </a:rPr>
+                                <m:t>𝑧</m:t>
+                              </m:r>
+                            </m:e>
+                          </m:d>
+                        </m:num>
+                        <m:den>
+                          <m:r>
+                            <a:rPr lang="en-US" sz="2400" b="0" i="1" smtClean="0">
+                              <a:latin typeface="Cambria Math" panose="02040503050406030204" pitchFamily="18" charset="0"/>
+                            </a:rPr>
+                            <m:t>𝑋</m:t>
+                          </m:r>
+                          <m:d>
+                            <m:dPr>
+                              <m:ctrlPr>
+                                <a:rPr lang="en-US" sz="2400" b="0" i="1" smtClean="0">
+                                  <a:latin typeface="Cambria Math" panose="02040503050406030204" pitchFamily="18" charset="0"/>
+                                </a:rPr>
+                              </m:ctrlPr>
+                            </m:dPr>
+                            <m:e>
+                              <m:r>
+                                <a:rPr lang="en-US" sz="2400" b="0" i="1" smtClean="0">
+                                  <a:latin typeface="Cambria Math" panose="02040503050406030204" pitchFamily="18" charset="0"/>
+                                </a:rPr>
+                                <m:t>𝑧</m:t>
+                              </m:r>
+                            </m:e>
+                          </m:d>
+                        </m:den>
+                      </m:f>
+                      <m:r>
+                        <a:rPr lang="en-US" sz="2400" b="0" i="1" smtClean="0">
+                          <a:latin typeface="Cambria Math" panose="02040503050406030204" pitchFamily="18" charset="0"/>
+                        </a:rPr>
+                        <m:t>=</m:t>
+                      </m:r>
+                      <m:f>
+                        <m:fPr>
+                          <m:ctrlPr>
+                            <a:rPr lang="en-US" sz="2400" b="0" i="1" smtClean="0">
+                              <a:latin typeface="Cambria Math" panose="02040503050406030204" pitchFamily="18" charset="0"/>
+                            </a:rPr>
+                          </m:ctrlPr>
+                        </m:fPr>
+                        <m:num>
+                          <m:r>
+                            <a:rPr lang="en-US" sz="2400" b="0" i="1" smtClean="0">
+                              <a:latin typeface="Cambria Math" panose="02040503050406030204" pitchFamily="18" charset="0"/>
+                            </a:rPr>
+                            <m:t>4</m:t>
+                          </m:r>
+                          <m:r>
+                            <a:rPr lang="en-US" sz="2400" b="0" i="1" smtClean="0">
+                              <a:latin typeface="Cambria Math" panose="02040503050406030204" pitchFamily="18" charset="0"/>
+                            </a:rPr>
+                            <m:t>𝜋</m:t>
+                          </m:r>
+                          <m:r>
+                            <a:rPr lang="en-US" sz="2400" b="0" i="1" smtClean="0">
+                              <a:latin typeface="Cambria Math" panose="02040503050406030204" pitchFamily="18" charset="0"/>
+                            </a:rPr>
+                            <m:t>(1+</m:t>
+                          </m:r>
+                          <m:sSup>
+                            <m:sSupPr>
+                              <m:ctrlPr>
+                                <a:rPr lang="en-US" sz="2400" b="0" i="1" smtClean="0">
+                                  <a:latin typeface="Cambria Math" panose="02040503050406030204" pitchFamily="18" charset="0"/>
+                                </a:rPr>
+                              </m:ctrlPr>
+                            </m:sSupPr>
+                            <m:e>
+                              <m:r>
+                                <a:rPr lang="en-US" sz="2400" b="0" i="1" smtClean="0">
+                                  <a:latin typeface="Cambria Math" panose="02040503050406030204" pitchFamily="18" charset="0"/>
+                                </a:rPr>
+                                <m:t>𝑧</m:t>
+                              </m:r>
+                            </m:e>
+                            <m:sup>
+                              <m:r>
+                                <a:rPr lang="en-US" sz="2400" b="0" i="1" smtClean="0">
+                                  <a:latin typeface="Cambria Math" panose="02040503050406030204" pitchFamily="18" charset="0"/>
+                                </a:rPr>
+                                <m:t>−1</m:t>
+                              </m:r>
+                            </m:sup>
+                          </m:sSup>
+                          <m:r>
+                            <a:rPr lang="en-US" sz="2400" b="0" i="1" smtClean="0">
+                              <a:latin typeface="Cambria Math" panose="02040503050406030204" pitchFamily="18" charset="0"/>
+                            </a:rPr>
+                            <m:t>)</m:t>
+                          </m:r>
+                        </m:num>
+                        <m:den>
+                          <m:r>
+                            <a:rPr lang="en-US" sz="2400" i="1">
+                              <a:latin typeface="Cambria Math" panose="02040503050406030204" pitchFamily="18" charset="0"/>
+                            </a:rPr>
+                            <m:t>2012.56637−1987.4336</m:t>
+                          </m:r>
+                          <m:sSup>
+                            <m:sSupPr>
+                              <m:ctrlPr>
+                                <a:rPr lang="en-US" sz="2400" b="0" i="1" smtClean="0">
+                                  <a:latin typeface="Cambria Math" panose="02040503050406030204" pitchFamily="18" charset="0"/>
+                                </a:rPr>
+                              </m:ctrlPr>
+                            </m:sSupPr>
+                            <m:e>
+                              <m:r>
+                                <a:rPr lang="en-US" sz="2400" b="0" i="1" smtClean="0">
+                                  <a:latin typeface="Cambria Math" panose="02040503050406030204" pitchFamily="18" charset="0"/>
+                                </a:rPr>
+                                <m:t>𝑧</m:t>
+                              </m:r>
+                            </m:e>
+                            <m:sup>
+                              <m:r>
+                                <a:rPr lang="en-US" sz="2400" b="0" i="1" smtClean="0">
+                                  <a:latin typeface="Cambria Math" panose="02040503050406030204" pitchFamily="18" charset="0"/>
+                                </a:rPr>
+                                <m:t>−1</m:t>
+                              </m:r>
+                            </m:sup>
+                          </m:sSup>
+                        </m:den>
+                      </m:f>
+                    </m:oMath>
+                  </m:oMathPara>
+                </a14:m>
+                <a:endParaRPr lang="en-US" sz="2400" dirty="0"/>
+              </a:p>
+            </p:txBody>
+          </p:sp>
+        </mc:Choice>
+        <mc:Fallback>
+          <p:sp>
+            <p:nvSpPr>
+              <p:cNvPr id="3" name="Content Placeholder 2">
+                <a:extLst>
+                  <a:ext uri="{FF2B5EF4-FFF2-40B4-BE49-F238E27FC236}">
+                    <a16:creationId xmlns:a16="http://schemas.microsoft.com/office/drawing/2014/main" id="{53EDD516-EC11-4014-B44B-FDE1EBF6335A}"/>
+                  </a:ext>
+                </a:extLst>
+              </p:cNvPr>
+              <p:cNvSpPr>
+                <a:spLocks noGrp="1" noRot="1" noChangeAspect="1" noMove="1" noResize="1" noEditPoints="1" noAdjustHandles="1" noChangeArrowheads="1" noChangeShapeType="1" noTextEdit="1"/>
+              </p:cNvSpPr>
+              <p:nvPr>
+                <p:ph idx="1"/>
+              </p:nvPr>
+            </p:nvSpPr>
+            <p:spPr>
+              <a:blipFill>
+                <a:blip r:embed="rId2"/>
+                <a:stretch>
+                  <a:fillRect/>
+                </a:stretch>
+              </a:blipFill>
+            </p:spPr>
+            <p:txBody>
+              <a:bodyPr/>
+              <a:lstStyle/>
+              <a:p>
+                <a:r>
+                  <a:rPr lang="en-US">
+                    <a:noFill/>
+                  </a:rPr>
+                  <a:t> </a:t>
+                </a:r>
+              </a:p>
+            </p:txBody>
+          </p:sp>
+        </mc:Fallback>
+      </mc:AlternateContent>
+    </p:spTree>
+    <p:extLst>
+      <p:ext uri="{BB962C8B-B14F-4D97-AF65-F5344CB8AC3E}">
+        <p14:creationId xmlns:p14="http://schemas.microsoft.com/office/powerpoint/2010/main" val="1668306319"/>
+      </p:ext>
+    </p:extLst>
+  </p:cSld>
+  <p:clrMapOvr>
+    <a:masterClrMapping/>
+  </p:clrMapOvr>
+</p:sld>
+</file>
+
+<file path=ppt/slides/slide12.xml><?xml version="1.0" encoding="utf-8"?>
+<p:sld xmlns:a="http://schemas.openxmlformats.org/drawingml/2006/main" xmlns:r="http://schemas.openxmlformats.org/officeDocument/2006/relationships" xmlns:p="http://schemas.openxmlformats.org/presentationml/2006/main">
+  <p:cSld>
+    <p:spTree>
+      <p:nvGrpSpPr>
+        <p:cNvPr id="1" name=""/>
+        <p:cNvGrpSpPr/>
+        <p:nvPr/>
+      </p:nvGrpSpPr>
+      <p:grpSpPr>
+        <a:xfrm>
+          <a:off x="0" y="0"/>
+          <a:ext cx="0" cy="0"/>
+          <a:chOff x="0" y="0"/>
+          <a:chExt cx="0" cy="0"/>
+        </a:xfrm>
+      </p:grpSpPr>
+      <p:sp>
+        <p:nvSpPr>
+          <p:cNvPr id="2" name="Title 1">
+            <a:extLst>
+              <a:ext uri="{FF2B5EF4-FFF2-40B4-BE49-F238E27FC236}">
+                <a16:creationId xmlns:a16="http://schemas.microsoft.com/office/drawing/2014/main" id="{B1FB1FC2-78BB-4676-BD94-E0256C4D12B5}"/>
+              </a:ext>
+            </a:extLst>
+          </p:cNvPr>
+          <p:cNvSpPr>
+            <a:spLocks noGrp="1"/>
+          </p:cNvSpPr>
+          <p:nvPr>
+            <p:ph type="title"/>
+          </p:nvPr>
+        </p:nvSpPr>
+        <p:spPr/>
+        <p:txBody>
+          <a:bodyPr/>
+          <a:lstStyle/>
+          <a:p>
+            <a:r>
+              <a:rPr lang="en-US" dirty="0"/>
+              <a:t>Filter Realization (Z-Inverse)</a:t>
+            </a:r>
+          </a:p>
+        </p:txBody>
+      </p:sp>
+      <mc:AlternateContent xmlns:mc="http://schemas.openxmlformats.org/markup-compatibility/2006">
+        <mc:Choice xmlns:a14="http://schemas.microsoft.com/office/drawing/2010/main" Requires="a14">
+          <p:sp>
+            <p:nvSpPr>
+              <p:cNvPr id="3" name="Content Placeholder 2">
+                <a:extLst>
+                  <a:ext uri="{FF2B5EF4-FFF2-40B4-BE49-F238E27FC236}">
+                    <a16:creationId xmlns:a16="http://schemas.microsoft.com/office/drawing/2014/main" id="{C38077D7-350F-4B96-8B4C-F2FFA3CBAE33}"/>
+                  </a:ext>
+                </a:extLst>
+              </p:cNvPr>
+              <p:cNvSpPr>
+                <a:spLocks noGrp="1"/>
+              </p:cNvSpPr>
+              <p:nvPr>
+                <p:ph idx="1"/>
+              </p:nvPr>
+            </p:nvSpPr>
+            <p:spPr/>
+            <p:txBody>
+              <a:bodyPr/>
+              <a:lstStyle/>
+              <a:p>
+                <a:pPr marL="0" indent="0">
+                  <a:buNone/>
+                </a:pPr>
+                <a14:m>
+                  <m:oMathPara xmlns:m="http://schemas.openxmlformats.org/officeDocument/2006/math">
+                    <m:oMathParaPr>
+                      <m:jc m:val="centerGroup"/>
+                    </m:oMathParaPr>
+                    <m:oMath xmlns:m="http://schemas.openxmlformats.org/officeDocument/2006/math">
+                      <m:r>
+                        <a:rPr lang="en-US" sz="2400" b="0" i="1" smtClean="0">
+                          <a:latin typeface="Cambria Math" panose="02040503050406030204" pitchFamily="18" charset="0"/>
+                        </a:rPr>
+                        <m:t>𝑌</m:t>
+                      </m:r>
+                      <m:d>
+                        <m:dPr>
+                          <m:ctrlPr>
+                            <a:rPr lang="en-US" sz="2400" b="0" i="1" smtClean="0">
+                              <a:latin typeface="Cambria Math" panose="02040503050406030204" pitchFamily="18" charset="0"/>
+                            </a:rPr>
+                          </m:ctrlPr>
+                        </m:dPr>
+                        <m:e>
+                          <m:r>
+                            <a:rPr lang="en-US" sz="2400" b="0" i="1" smtClean="0">
+                              <a:latin typeface="Cambria Math" panose="02040503050406030204" pitchFamily="18" charset="0"/>
+                            </a:rPr>
+                            <m:t>𝑧</m:t>
+                          </m:r>
+                        </m:e>
+                      </m:d>
+                      <m:d>
+                        <m:dPr>
+                          <m:ctrlPr>
+                            <a:rPr lang="en-US" sz="2400" b="0" i="1" smtClean="0">
+                              <a:latin typeface="Cambria Math" panose="02040503050406030204" pitchFamily="18" charset="0"/>
+                            </a:rPr>
+                          </m:ctrlPr>
+                        </m:dPr>
+                        <m:e>
+                          <m:r>
+                            <a:rPr lang="en-US" sz="2400" i="1">
+                              <a:latin typeface="Cambria Math" panose="02040503050406030204" pitchFamily="18" charset="0"/>
+                            </a:rPr>
+                            <m:t>2012.56637−1987.4336</m:t>
+                          </m:r>
+                          <m:sSup>
+                            <m:sSupPr>
+                              <m:ctrlPr>
+                                <a:rPr lang="en-US" sz="2400" b="0" i="1" smtClean="0">
+                                  <a:latin typeface="Cambria Math" panose="02040503050406030204" pitchFamily="18" charset="0"/>
+                                </a:rPr>
+                              </m:ctrlPr>
+                            </m:sSupPr>
+                            <m:e>
+                              <m:r>
+                                <a:rPr lang="en-US" sz="2400" b="0" i="1" smtClean="0">
+                                  <a:latin typeface="Cambria Math" panose="02040503050406030204" pitchFamily="18" charset="0"/>
+                                </a:rPr>
+                                <m:t>𝑧</m:t>
+                              </m:r>
+                            </m:e>
+                            <m:sup>
+                              <m:r>
+                                <a:rPr lang="en-US" sz="2400" b="0" i="1" smtClean="0">
+                                  <a:latin typeface="Cambria Math" panose="02040503050406030204" pitchFamily="18" charset="0"/>
+                                </a:rPr>
+                                <m:t>−1</m:t>
+                              </m:r>
+                            </m:sup>
+                          </m:sSup>
+                        </m:e>
+                      </m:d>
+                      <m:r>
+                        <a:rPr lang="en-US" sz="2400" b="0" i="1" smtClean="0">
+                          <a:latin typeface="Cambria Math" panose="02040503050406030204" pitchFamily="18" charset="0"/>
+                        </a:rPr>
+                        <m:t>=</m:t>
+                      </m:r>
+                      <m:r>
+                        <a:rPr lang="en-US" sz="2400" b="0" i="1" smtClean="0">
+                          <a:latin typeface="Cambria Math" panose="02040503050406030204" pitchFamily="18" charset="0"/>
+                        </a:rPr>
+                        <m:t>𝑋</m:t>
+                      </m:r>
+                      <m:d>
+                        <m:dPr>
+                          <m:ctrlPr>
+                            <a:rPr lang="en-US" sz="2400" b="0" i="1" smtClean="0">
+                              <a:latin typeface="Cambria Math" panose="02040503050406030204" pitchFamily="18" charset="0"/>
+                            </a:rPr>
+                          </m:ctrlPr>
+                        </m:dPr>
+                        <m:e>
+                          <m:r>
+                            <a:rPr lang="en-US" sz="2400" b="0" i="1" smtClean="0">
+                              <a:latin typeface="Cambria Math" panose="02040503050406030204" pitchFamily="18" charset="0"/>
+                            </a:rPr>
+                            <m:t>𝑧</m:t>
+                          </m:r>
+                        </m:e>
+                      </m:d>
+                      <m:r>
+                        <a:rPr lang="en-US" sz="2400" i="1">
+                          <a:latin typeface="Cambria Math" panose="02040503050406030204" pitchFamily="18" charset="0"/>
+                        </a:rPr>
+                        <m:t>4</m:t>
+                      </m:r>
+                      <m:r>
+                        <a:rPr lang="en-US" sz="2400" i="1">
+                          <a:latin typeface="Cambria Math" panose="02040503050406030204" pitchFamily="18" charset="0"/>
+                        </a:rPr>
+                        <m:t>𝜋</m:t>
+                      </m:r>
+                      <m:d>
+                        <m:dPr>
+                          <m:ctrlPr>
+                            <a:rPr lang="en-US" sz="2400" i="1">
+                              <a:latin typeface="Cambria Math" panose="02040503050406030204" pitchFamily="18" charset="0"/>
+                            </a:rPr>
+                          </m:ctrlPr>
+                        </m:dPr>
+                        <m:e>
+                          <m:r>
+                            <a:rPr lang="en-US" sz="2400" b="0" i="1" smtClean="0">
+                              <a:latin typeface="Cambria Math" panose="02040503050406030204" pitchFamily="18" charset="0"/>
+                            </a:rPr>
+                            <m:t>1</m:t>
+                          </m:r>
+                          <m:r>
+                            <a:rPr lang="en-US" sz="2400" i="1">
+                              <a:latin typeface="Cambria Math" panose="02040503050406030204" pitchFamily="18" charset="0"/>
+                            </a:rPr>
+                            <m:t>+</m:t>
+                          </m:r>
+                          <m:sSup>
+                            <m:sSupPr>
+                              <m:ctrlPr>
+                                <a:rPr lang="en-US" sz="2400" b="0" i="1" smtClean="0">
+                                  <a:latin typeface="Cambria Math" panose="02040503050406030204" pitchFamily="18" charset="0"/>
+                                </a:rPr>
+                              </m:ctrlPr>
+                            </m:sSupPr>
+                            <m:e>
+                              <m:r>
+                                <a:rPr lang="en-US" sz="2400" b="0" i="1" smtClean="0">
+                                  <a:latin typeface="Cambria Math" panose="02040503050406030204" pitchFamily="18" charset="0"/>
+                                </a:rPr>
+                                <m:t>𝑧</m:t>
+                              </m:r>
+                            </m:e>
+                            <m:sup>
+                              <m:r>
+                                <a:rPr lang="en-US" sz="2400" b="0" i="1" smtClean="0">
+                                  <a:latin typeface="Cambria Math" panose="02040503050406030204" pitchFamily="18" charset="0"/>
+                                </a:rPr>
+                                <m:t>−1</m:t>
+                              </m:r>
+                            </m:sup>
+                          </m:sSup>
+                        </m:e>
+                      </m:d>
+                    </m:oMath>
+                  </m:oMathPara>
+                </a14:m>
+                <a:endParaRPr lang="en-US" sz="2400" dirty="0"/>
+              </a:p>
+              <a:p>
+                <a:pPr marL="0" indent="0">
+                  <a:buNone/>
+                </a:pPr>
+                <a:endParaRPr lang="en-US" sz="2400" dirty="0"/>
+              </a:p>
+              <a:p>
+                <a:pPr marL="0" indent="0">
+                  <a:buNone/>
+                </a:pPr>
+                <a14:m>
+                  <m:oMathPara xmlns:m="http://schemas.openxmlformats.org/officeDocument/2006/math">
+                    <m:oMathParaPr>
+                      <m:jc m:val="centerGroup"/>
+                    </m:oMathParaPr>
+                    <m:oMath xmlns:m="http://schemas.openxmlformats.org/officeDocument/2006/math">
+                      <m:r>
+                        <a:rPr lang="en-US" sz="2400" b="0" i="1" smtClean="0">
+                          <a:latin typeface="Cambria Math" panose="02040503050406030204" pitchFamily="18" charset="0"/>
+                        </a:rPr>
+                        <m:t>2012.56637∗</m:t>
+                      </m:r>
+                      <m:r>
+                        <a:rPr lang="en-US" sz="2400" b="0" i="1" smtClean="0">
+                          <a:latin typeface="Cambria Math" panose="02040503050406030204" pitchFamily="18" charset="0"/>
+                        </a:rPr>
+                        <m:t>𝑌</m:t>
+                      </m:r>
+                      <m:d>
+                        <m:dPr>
+                          <m:ctrlPr>
+                            <a:rPr lang="en-US" sz="2400" b="0" i="1" smtClean="0">
+                              <a:latin typeface="Cambria Math" panose="02040503050406030204" pitchFamily="18" charset="0"/>
+                            </a:rPr>
+                          </m:ctrlPr>
+                        </m:dPr>
+                        <m:e>
+                          <m:r>
+                            <a:rPr lang="en-US" sz="2400" b="0" i="1" smtClean="0">
+                              <a:latin typeface="Cambria Math" panose="02040503050406030204" pitchFamily="18" charset="0"/>
+                            </a:rPr>
+                            <m:t>𝑧</m:t>
+                          </m:r>
+                        </m:e>
+                      </m:d>
+                      <m:r>
+                        <a:rPr lang="en-US" sz="2400" b="0" i="1" smtClean="0">
+                          <a:latin typeface="Cambria Math" panose="02040503050406030204" pitchFamily="18" charset="0"/>
+                        </a:rPr>
+                        <m:t>−1987.4336</m:t>
+                      </m:r>
+                      <m:sSup>
+                        <m:sSupPr>
+                          <m:ctrlPr>
+                            <a:rPr lang="en-US" sz="2400" b="0" i="1" smtClean="0">
+                              <a:latin typeface="Cambria Math" panose="02040503050406030204" pitchFamily="18" charset="0"/>
+                            </a:rPr>
+                          </m:ctrlPr>
+                        </m:sSupPr>
+                        <m:e>
+                          <m:r>
+                            <a:rPr lang="en-US" sz="2400" b="0" i="1" smtClean="0">
+                              <a:latin typeface="Cambria Math" panose="02040503050406030204" pitchFamily="18" charset="0"/>
+                            </a:rPr>
+                            <m:t>𝑧</m:t>
+                          </m:r>
+                        </m:e>
+                        <m:sup>
+                          <m:r>
+                            <a:rPr lang="en-US" sz="2400" b="0" i="1" smtClean="0">
+                              <a:latin typeface="Cambria Math" panose="02040503050406030204" pitchFamily="18" charset="0"/>
+                            </a:rPr>
+                            <m:t>−1</m:t>
+                          </m:r>
+                        </m:sup>
+                      </m:sSup>
+                      <m:r>
+                        <a:rPr lang="en-US" sz="2400" b="0" i="1" smtClean="0">
+                          <a:latin typeface="Cambria Math" panose="02040503050406030204" pitchFamily="18" charset="0"/>
+                        </a:rPr>
+                        <m:t>∗</m:t>
+                      </m:r>
+                      <m:r>
+                        <a:rPr lang="en-US" sz="2400" b="0" i="1" smtClean="0">
+                          <a:latin typeface="Cambria Math" panose="02040503050406030204" pitchFamily="18" charset="0"/>
+                        </a:rPr>
+                        <m:t>𝑌</m:t>
+                      </m:r>
+                      <m:d>
+                        <m:dPr>
+                          <m:ctrlPr>
+                            <a:rPr lang="en-US" sz="2400" b="0" i="1" smtClean="0">
+                              <a:latin typeface="Cambria Math" panose="02040503050406030204" pitchFamily="18" charset="0"/>
+                            </a:rPr>
+                          </m:ctrlPr>
+                        </m:dPr>
+                        <m:e>
+                          <m:r>
+                            <a:rPr lang="en-US" sz="2400" b="0" i="1" smtClean="0">
+                              <a:latin typeface="Cambria Math" panose="02040503050406030204" pitchFamily="18" charset="0"/>
+                            </a:rPr>
+                            <m:t>𝑧</m:t>
+                          </m:r>
+                        </m:e>
+                      </m:d>
+                      <m:r>
+                        <a:rPr lang="en-US" sz="2400" b="0" i="1" smtClean="0">
+                          <a:latin typeface="Cambria Math" panose="02040503050406030204" pitchFamily="18" charset="0"/>
+                        </a:rPr>
+                        <m:t>=4</m:t>
+                      </m:r>
+                      <m:r>
+                        <a:rPr lang="en-US" sz="2400" b="0" i="1" smtClean="0">
+                          <a:latin typeface="Cambria Math" panose="02040503050406030204" pitchFamily="18" charset="0"/>
+                        </a:rPr>
+                        <m:t>𝜋</m:t>
+                      </m:r>
+                      <m:r>
+                        <a:rPr lang="en-US" sz="2400" b="0" i="1" smtClean="0">
+                          <a:latin typeface="Cambria Math" panose="02040503050406030204" pitchFamily="18" charset="0"/>
+                        </a:rPr>
+                        <m:t>𝑋</m:t>
+                      </m:r>
+                      <m:d>
+                        <m:dPr>
+                          <m:ctrlPr>
+                            <a:rPr lang="en-US" sz="2400" b="0" i="1" smtClean="0">
+                              <a:latin typeface="Cambria Math" panose="02040503050406030204" pitchFamily="18" charset="0"/>
+                            </a:rPr>
+                          </m:ctrlPr>
+                        </m:dPr>
+                        <m:e>
+                          <m:r>
+                            <a:rPr lang="en-US" sz="2400" b="0" i="1" smtClean="0">
+                              <a:latin typeface="Cambria Math" panose="02040503050406030204" pitchFamily="18" charset="0"/>
+                            </a:rPr>
+                            <m:t>𝑧</m:t>
+                          </m:r>
+                        </m:e>
+                      </m:d>
+                      <m:r>
+                        <a:rPr lang="en-US" sz="2400" b="0" i="1" smtClean="0">
+                          <a:latin typeface="Cambria Math" panose="02040503050406030204" pitchFamily="18" charset="0"/>
+                        </a:rPr>
+                        <m:t>+4</m:t>
+                      </m:r>
+                      <m:r>
+                        <a:rPr lang="en-US" sz="2400" b="0" i="1" smtClean="0">
+                          <a:latin typeface="Cambria Math" panose="02040503050406030204" pitchFamily="18" charset="0"/>
+                        </a:rPr>
+                        <m:t>𝜋</m:t>
+                      </m:r>
+                      <m:sSup>
+                        <m:sSupPr>
+                          <m:ctrlPr>
+                            <a:rPr lang="en-US" sz="2400" b="0" i="1" smtClean="0">
+                              <a:latin typeface="Cambria Math" panose="02040503050406030204" pitchFamily="18" charset="0"/>
+                            </a:rPr>
+                          </m:ctrlPr>
+                        </m:sSupPr>
+                        <m:e>
+                          <m:r>
+                            <a:rPr lang="en-US" sz="2400" b="0" i="1" smtClean="0">
+                              <a:latin typeface="Cambria Math" panose="02040503050406030204" pitchFamily="18" charset="0"/>
+                            </a:rPr>
+                            <m:t>𝑧</m:t>
+                          </m:r>
+                        </m:e>
+                        <m:sup>
+                          <m:r>
+                            <a:rPr lang="en-US" sz="2400" b="0" i="1" smtClean="0">
+                              <a:latin typeface="Cambria Math" panose="02040503050406030204" pitchFamily="18" charset="0"/>
+                            </a:rPr>
+                            <m:t>−1</m:t>
+                          </m:r>
+                        </m:sup>
+                      </m:sSup>
+                      <m:r>
+                        <a:rPr lang="en-US" sz="2400" b="0" i="1" smtClean="0">
+                          <a:latin typeface="Cambria Math" panose="02040503050406030204" pitchFamily="18" charset="0"/>
+                        </a:rPr>
+                        <m:t>𝑋</m:t>
+                      </m:r>
+                      <m:d>
+                        <m:dPr>
+                          <m:ctrlPr>
+                            <a:rPr lang="en-US" sz="2400" b="0" i="1" smtClean="0">
+                              <a:latin typeface="Cambria Math" panose="02040503050406030204" pitchFamily="18" charset="0"/>
+                            </a:rPr>
+                          </m:ctrlPr>
+                        </m:dPr>
+                        <m:e>
+                          <m:r>
+                            <a:rPr lang="en-US" sz="2400" b="0" i="1" smtClean="0">
+                              <a:latin typeface="Cambria Math" panose="02040503050406030204" pitchFamily="18" charset="0"/>
+                            </a:rPr>
+                            <m:t>𝑧</m:t>
+                          </m:r>
+                        </m:e>
+                      </m:d>
+                    </m:oMath>
+                  </m:oMathPara>
+                </a14:m>
+                <a:endParaRPr lang="en-US" sz="2400" dirty="0"/>
+              </a:p>
+              <a:p>
+                <a:pPr marL="0" indent="0">
+                  <a:buNone/>
+                </a:pPr>
+                <a:endParaRPr lang="en-US" sz="2400" dirty="0"/>
+              </a:p>
+              <a:p>
+                <a:pPr marL="0" indent="0">
+                  <a:buNone/>
+                </a:pPr>
+                <a14:m>
+                  <m:oMathPara xmlns:m="http://schemas.openxmlformats.org/officeDocument/2006/math">
+                    <m:oMathParaPr>
+                      <m:jc m:val="centerGroup"/>
+                    </m:oMathParaPr>
+                    <m:oMath xmlns:m="http://schemas.openxmlformats.org/officeDocument/2006/math">
+                      <m:r>
+                        <a:rPr lang="en-US" sz="2400" b="0" i="1" smtClean="0">
+                          <a:latin typeface="Cambria Math" panose="02040503050406030204" pitchFamily="18" charset="0"/>
+                        </a:rPr>
+                        <m:t>𝑌</m:t>
+                      </m:r>
+                      <m:d>
+                        <m:dPr>
+                          <m:ctrlPr>
+                            <a:rPr lang="en-US" sz="2400" b="0" i="1" smtClean="0">
+                              <a:latin typeface="Cambria Math" panose="02040503050406030204" pitchFamily="18" charset="0"/>
+                            </a:rPr>
+                          </m:ctrlPr>
+                        </m:dPr>
+                        <m:e>
+                          <m:r>
+                            <a:rPr lang="en-US" sz="2400" b="0" i="1" smtClean="0">
+                              <a:latin typeface="Cambria Math" panose="02040503050406030204" pitchFamily="18" charset="0"/>
+                            </a:rPr>
+                            <m:t>𝑧</m:t>
+                          </m:r>
+                        </m:e>
+                      </m:d>
+                      <m:r>
+                        <a:rPr lang="en-US" sz="2400" i="1">
+                          <a:latin typeface="Cambria Math" panose="02040503050406030204" pitchFamily="18" charset="0"/>
+                        </a:rPr>
+                        <m:t>=0.98751</m:t>
+                      </m:r>
+                      <m:sSup>
+                        <m:sSupPr>
+                          <m:ctrlPr>
+                            <a:rPr lang="en-US" sz="2400" b="0" i="1" smtClean="0">
+                              <a:latin typeface="Cambria Math" panose="02040503050406030204" pitchFamily="18" charset="0"/>
+                            </a:rPr>
+                          </m:ctrlPr>
+                        </m:sSupPr>
+                        <m:e>
+                          <m:r>
+                            <a:rPr lang="en-US" sz="2400" b="0" i="1" smtClean="0">
+                              <a:latin typeface="Cambria Math" panose="02040503050406030204" pitchFamily="18" charset="0"/>
+                            </a:rPr>
+                            <m:t>𝑧</m:t>
+                          </m:r>
+                        </m:e>
+                        <m:sup>
+                          <m:r>
+                            <a:rPr lang="en-US" sz="2400" b="0" i="1" smtClean="0">
+                              <a:latin typeface="Cambria Math" panose="02040503050406030204" pitchFamily="18" charset="0"/>
+                            </a:rPr>
+                            <m:t>−1</m:t>
+                          </m:r>
+                        </m:sup>
+                      </m:sSup>
+                      <m:r>
+                        <a:rPr lang="en-US" sz="2400" b="0" i="1" smtClean="0">
+                          <a:latin typeface="Cambria Math" panose="02040503050406030204" pitchFamily="18" charset="0"/>
+                        </a:rPr>
+                        <m:t>𝑌</m:t>
+                      </m:r>
+                      <m:d>
+                        <m:dPr>
+                          <m:ctrlPr>
+                            <a:rPr lang="en-US" sz="2400" b="0" i="1" smtClean="0">
+                              <a:latin typeface="Cambria Math" panose="02040503050406030204" pitchFamily="18" charset="0"/>
+                            </a:rPr>
+                          </m:ctrlPr>
+                        </m:dPr>
+                        <m:e>
+                          <m:r>
+                            <a:rPr lang="en-US" sz="2400" b="0" i="1" smtClean="0">
+                              <a:latin typeface="Cambria Math" panose="02040503050406030204" pitchFamily="18" charset="0"/>
+                            </a:rPr>
+                            <m:t>𝑧</m:t>
+                          </m:r>
+                        </m:e>
+                      </m:d>
+                      <m:r>
+                        <a:rPr lang="en-US" sz="2400" i="1">
+                          <a:latin typeface="Cambria Math" panose="02040503050406030204" pitchFamily="18" charset="0"/>
+                        </a:rPr>
+                        <m:t>+0.0062439</m:t>
+                      </m:r>
+                      <m:r>
+                        <a:rPr lang="en-US" sz="2400" b="0" i="1" smtClean="0">
+                          <a:latin typeface="Cambria Math" panose="02040503050406030204" pitchFamily="18" charset="0"/>
+                        </a:rPr>
+                        <m:t>𝑋</m:t>
+                      </m:r>
+                      <m:d>
+                        <m:dPr>
+                          <m:ctrlPr>
+                            <a:rPr lang="en-US" sz="2400" b="0" i="1" smtClean="0">
+                              <a:latin typeface="Cambria Math" panose="02040503050406030204" pitchFamily="18" charset="0"/>
+                            </a:rPr>
+                          </m:ctrlPr>
+                        </m:dPr>
+                        <m:e>
+                          <m:r>
+                            <a:rPr lang="en-US" sz="2400" b="0" i="1" smtClean="0">
+                              <a:latin typeface="Cambria Math" panose="02040503050406030204" pitchFamily="18" charset="0"/>
+                            </a:rPr>
+                            <m:t>𝑧</m:t>
+                          </m:r>
+                        </m:e>
+                      </m:d>
+                      <m:r>
+                        <a:rPr lang="en-US" sz="2400" i="1">
+                          <a:latin typeface="Cambria Math" panose="02040503050406030204" pitchFamily="18" charset="0"/>
+                        </a:rPr>
+                        <m:t>+0.0062439</m:t>
+                      </m:r>
+                      <m:sSup>
+                        <m:sSupPr>
+                          <m:ctrlPr>
+                            <a:rPr lang="en-US" sz="2400" b="0" i="1" smtClean="0">
+                              <a:latin typeface="Cambria Math" panose="02040503050406030204" pitchFamily="18" charset="0"/>
+                            </a:rPr>
+                          </m:ctrlPr>
+                        </m:sSupPr>
+                        <m:e>
+                          <m:r>
+                            <a:rPr lang="en-US" sz="2400" b="0" i="1" smtClean="0">
+                              <a:latin typeface="Cambria Math" panose="02040503050406030204" pitchFamily="18" charset="0"/>
+                            </a:rPr>
+                            <m:t>𝑧</m:t>
+                          </m:r>
+                        </m:e>
+                        <m:sup>
+                          <m:r>
+                            <a:rPr lang="en-US" sz="2400" b="0" i="1" smtClean="0">
+                              <a:latin typeface="Cambria Math" panose="02040503050406030204" pitchFamily="18" charset="0"/>
+                            </a:rPr>
+                            <m:t>−1</m:t>
+                          </m:r>
+                        </m:sup>
+                      </m:sSup>
+                      <m:r>
+                        <a:rPr lang="en-US" sz="2400" b="0" i="1" smtClean="0">
+                          <a:latin typeface="Cambria Math" panose="02040503050406030204" pitchFamily="18" charset="0"/>
+                        </a:rPr>
+                        <m:t>𝑋</m:t>
+                      </m:r>
+                      <m:d>
+                        <m:dPr>
+                          <m:ctrlPr>
+                            <a:rPr lang="en-US" sz="2400" b="0" i="1" smtClean="0">
+                              <a:latin typeface="Cambria Math" panose="02040503050406030204" pitchFamily="18" charset="0"/>
+                            </a:rPr>
+                          </m:ctrlPr>
+                        </m:dPr>
+                        <m:e>
+                          <m:r>
+                            <a:rPr lang="en-US" sz="2400" b="0" i="1" smtClean="0">
+                              <a:latin typeface="Cambria Math" panose="02040503050406030204" pitchFamily="18" charset="0"/>
+                            </a:rPr>
+                            <m:t>𝑧</m:t>
+                          </m:r>
+                        </m:e>
+                      </m:d>
+                    </m:oMath>
+                  </m:oMathPara>
+                </a14:m>
+                <a:endParaRPr lang="en-US" sz="2400" b="0" dirty="0"/>
+              </a:p>
+              <a:p>
+                <a:pPr marL="0" indent="0">
+                  <a:buNone/>
+                </a:pPr>
+                <a:endParaRPr lang="en-US" sz="2400" dirty="0"/>
+              </a:p>
+              <a:p>
+                <a:pPr marL="0" indent="0">
+                  <a:buNone/>
+                </a:pPr>
+                <a14:m>
+                  <m:oMathPara xmlns:m="http://schemas.openxmlformats.org/officeDocument/2006/math">
+                    <m:oMathParaPr>
+                      <m:jc m:val="centerGroup"/>
+                    </m:oMathParaPr>
+                    <m:oMath xmlns:m="http://schemas.openxmlformats.org/officeDocument/2006/math">
+                      <m:r>
+                        <a:rPr lang="en-US" sz="2400" b="0" i="1" smtClean="0">
+                          <a:solidFill>
+                            <a:srgbClr val="FF0000"/>
+                          </a:solidFill>
+                          <a:latin typeface="Cambria Math" panose="02040503050406030204" pitchFamily="18" charset="0"/>
+                        </a:rPr>
+                        <m:t>𝑦</m:t>
+                      </m:r>
+                      <m:d>
+                        <m:dPr>
+                          <m:ctrlPr>
+                            <a:rPr lang="en-US" sz="2400" b="0" i="1" smtClean="0">
+                              <a:solidFill>
+                                <a:srgbClr val="FF0000"/>
+                              </a:solidFill>
+                              <a:latin typeface="Cambria Math" panose="02040503050406030204" pitchFamily="18" charset="0"/>
+                            </a:rPr>
+                          </m:ctrlPr>
+                        </m:dPr>
+                        <m:e>
+                          <m:r>
+                            <a:rPr lang="en-US" sz="2400" b="0" i="1" smtClean="0">
+                              <a:solidFill>
+                                <a:srgbClr val="FF0000"/>
+                              </a:solidFill>
+                              <a:latin typeface="Cambria Math" panose="02040503050406030204" pitchFamily="18" charset="0"/>
+                            </a:rPr>
+                            <m:t>𝑛</m:t>
+                          </m:r>
+                        </m:e>
+                      </m:d>
+                      <m:r>
+                        <a:rPr lang="en-US" sz="2400" b="0" i="1" smtClean="0">
+                          <a:solidFill>
+                            <a:srgbClr val="FF0000"/>
+                          </a:solidFill>
+                          <a:latin typeface="Cambria Math" panose="02040503050406030204" pitchFamily="18" charset="0"/>
+                        </a:rPr>
+                        <m:t>=0.98751</m:t>
+                      </m:r>
+                      <m:r>
+                        <a:rPr lang="en-US" sz="2400" b="0" i="1" smtClean="0">
+                          <a:solidFill>
+                            <a:srgbClr val="FF0000"/>
+                          </a:solidFill>
+                          <a:latin typeface="Cambria Math" panose="02040503050406030204" pitchFamily="18" charset="0"/>
+                        </a:rPr>
+                        <m:t>𝑦</m:t>
+                      </m:r>
+                      <m:d>
+                        <m:dPr>
+                          <m:ctrlPr>
+                            <a:rPr lang="en-US" sz="2400" b="0" i="1" smtClean="0">
+                              <a:solidFill>
+                                <a:srgbClr val="FF0000"/>
+                              </a:solidFill>
+                              <a:latin typeface="Cambria Math" panose="02040503050406030204" pitchFamily="18" charset="0"/>
+                            </a:rPr>
+                          </m:ctrlPr>
+                        </m:dPr>
+                        <m:e>
+                          <m:r>
+                            <a:rPr lang="en-US" sz="2400" b="0" i="1" smtClean="0">
+                              <a:solidFill>
+                                <a:srgbClr val="FF0000"/>
+                              </a:solidFill>
+                              <a:latin typeface="Cambria Math" panose="02040503050406030204" pitchFamily="18" charset="0"/>
+                            </a:rPr>
+                            <m:t>𝑛</m:t>
+                          </m:r>
+                          <m:r>
+                            <a:rPr lang="en-US" sz="2400" b="0" i="1" smtClean="0">
+                              <a:solidFill>
+                                <a:srgbClr val="FF0000"/>
+                              </a:solidFill>
+                              <a:latin typeface="Cambria Math" panose="02040503050406030204" pitchFamily="18" charset="0"/>
+                            </a:rPr>
+                            <m:t>−1</m:t>
+                          </m:r>
+                        </m:e>
+                      </m:d>
+                      <m:r>
+                        <a:rPr lang="en-US" sz="2400" b="0" i="1" smtClean="0">
+                          <a:solidFill>
+                            <a:srgbClr val="FF0000"/>
+                          </a:solidFill>
+                          <a:latin typeface="Cambria Math" panose="02040503050406030204" pitchFamily="18" charset="0"/>
+                        </a:rPr>
+                        <m:t>+0.0062439</m:t>
+                      </m:r>
+                      <m:r>
+                        <a:rPr lang="en-US" sz="2400" b="0" i="1" smtClean="0">
+                          <a:solidFill>
+                            <a:srgbClr val="FF0000"/>
+                          </a:solidFill>
+                          <a:latin typeface="Cambria Math" panose="02040503050406030204" pitchFamily="18" charset="0"/>
+                        </a:rPr>
+                        <m:t>𝑥</m:t>
+                      </m:r>
+                      <m:d>
+                        <m:dPr>
+                          <m:ctrlPr>
+                            <a:rPr lang="en-US" sz="2400" b="0" i="1" smtClean="0">
+                              <a:solidFill>
+                                <a:srgbClr val="FF0000"/>
+                              </a:solidFill>
+                              <a:latin typeface="Cambria Math" panose="02040503050406030204" pitchFamily="18" charset="0"/>
+                            </a:rPr>
+                          </m:ctrlPr>
+                        </m:dPr>
+                        <m:e>
+                          <m:r>
+                            <a:rPr lang="en-US" sz="2400" b="0" i="1" smtClean="0">
+                              <a:solidFill>
+                                <a:srgbClr val="FF0000"/>
+                              </a:solidFill>
+                              <a:latin typeface="Cambria Math" panose="02040503050406030204" pitchFamily="18" charset="0"/>
+                            </a:rPr>
+                            <m:t>𝑛</m:t>
+                          </m:r>
+                        </m:e>
+                      </m:d>
+                      <m:r>
+                        <a:rPr lang="en-US" sz="2400" b="0" i="1" smtClean="0">
+                          <a:solidFill>
+                            <a:srgbClr val="FF0000"/>
+                          </a:solidFill>
+                          <a:latin typeface="Cambria Math" panose="02040503050406030204" pitchFamily="18" charset="0"/>
+                        </a:rPr>
+                        <m:t>+0.0062439</m:t>
+                      </m:r>
+                      <m:r>
+                        <a:rPr lang="en-US" sz="2400" b="0" i="1" smtClean="0">
+                          <a:solidFill>
+                            <a:srgbClr val="FF0000"/>
+                          </a:solidFill>
+                          <a:latin typeface="Cambria Math" panose="02040503050406030204" pitchFamily="18" charset="0"/>
+                        </a:rPr>
+                        <m:t>𝑥</m:t>
+                      </m:r>
+                      <m:d>
+                        <m:dPr>
+                          <m:ctrlPr>
+                            <a:rPr lang="en-US" sz="2400" b="0" i="1" smtClean="0">
+                              <a:solidFill>
+                                <a:srgbClr val="FF0000"/>
+                              </a:solidFill>
+                              <a:latin typeface="Cambria Math" panose="02040503050406030204" pitchFamily="18" charset="0"/>
+                            </a:rPr>
+                          </m:ctrlPr>
+                        </m:dPr>
+                        <m:e>
+                          <m:r>
+                            <a:rPr lang="en-US" sz="2400" b="0" i="1" smtClean="0">
+                              <a:solidFill>
+                                <a:srgbClr val="FF0000"/>
+                              </a:solidFill>
+                              <a:latin typeface="Cambria Math" panose="02040503050406030204" pitchFamily="18" charset="0"/>
+                            </a:rPr>
+                            <m:t>𝑛</m:t>
+                          </m:r>
+                          <m:r>
+                            <a:rPr lang="en-US" sz="2400" b="0" i="1" smtClean="0">
+                              <a:solidFill>
+                                <a:srgbClr val="FF0000"/>
+                              </a:solidFill>
+                              <a:latin typeface="Cambria Math" panose="02040503050406030204" pitchFamily="18" charset="0"/>
+                            </a:rPr>
+                            <m:t>−1</m:t>
+                          </m:r>
+                        </m:e>
+                      </m:d>
+                    </m:oMath>
+                  </m:oMathPara>
+                </a14:m>
+                <a:endParaRPr lang="en-US" sz="2400" b="0" dirty="0">
+                  <a:solidFill>
+                    <a:srgbClr val="FF0000"/>
+                  </a:solidFill>
+                </a:endParaRPr>
+              </a:p>
+              <a:p>
+                <a:pPr marL="0" indent="0">
+                  <a:buNone/>
+                </a:pPr>
+                <a:endParaRPr lang="en-US" sz="2400" dirty="0"/>
+              </a:p>
+              <a:p>
+                <a:pPr marL="0" indent="0">
+                  <a:buNone/>
+                </a:pPr>
+                <a:r>
+                  <a:rPr lang="en-US" sz="2400" dirty="0"/>
+                  <a:t>The above equation will be used in the Arduino to filter the voltage readings from the potentiometer. Note that </a:t>
+                </a:r>
+                <a14:m>
+                  <m:oMath xmlns:m="http://schemas.openxmlformats.org/officeDocument/2006/math">
+                    <m:r>
+                      <a:rPr lang="en-US" sz="2400" b="0" i="1" smtClean="0">
+                        <a:latin typeface="Cambria Math" panose="02040503050406030204" pitchFamily="18" charset="0"/>
+                      </a:rPr>
+                      <m:t>𝑥</m:t>
+                    </m:r>
+                    <m:d>
+                      <m:dPr>
+                        <m:ctrlPr>
+                          <a:rPr lang="en-US" sz="2400" b="0" i="1" smtClean="0">
+                            <a:latin typeface="Cambria Math" panose="02040503050406030204" pitchFamily="18" charset="0"/>
+                          </a:rPr>
+                        </m:ctrlPr>
+                      </m:dPr>
+                      <m:e>
+                        <m:r>
+                          <a:rPr lang="en-US" sz="2400" b="0" i="1" smtClean="0">
+                            <a:latin typeface="Cambria Math" panose="02040503050406030204" pitchFamily="18" charset="0"/>
+                          </a:rPr>
+                          <m:t>𝑛</m:t>
+                        </m:r>
+                      </m:e>
+                    </m:d>
+                  </m:oMath>
+                </a14:m>
+                <a:r>
+                  <a:rPr lang="en-US" sz="2400" dirty="0"/>
+                  <a:t> is the raw input from the potentiometer at time n, while </a:t>
+                </a:r>
+                <a14:m>
+                  <m:oMath xmlns:m="http://schemas.openxmlformats.org/officeDocument/2006/math">
+                    <m:r>
+                      <a:rPr lang="en-US" sz="2400" b="0" i="1" smtClean="0">
+                        <a:latin typeface="Cambria Math" panose="02040503050406030204" pitchFamily="18" charset="0"/>
+                      </a:rPr>
+                      <m:t>𝑦</m:t>
+                    </m:r>
+                    <m:r>
+                      <a:rPr lang="en-US" sz="2400" b="0" i="1" smtClean="0">
+                        <a:latin typeface="Cambria Math" panose="02040503050406030204" pitchFamily="18" charset="0"/>
+                      </a:rPr>
+                      <m:t>(</m:t>
+                    </m:r>
+                    <m:r>
+                      <a:rPr lang="en-US" sz="2400" b="0" i="1" smtClean="0">
+                        <a:latin typeface="Cambria Math" panose="02040503050406030204" pitchFamily="18" charset="0"/>
+                      </a:rPr>
+                      <m:t>𝑛</m:t>
+                    </m:r>
+                    <m:r>
+                      <a:rPr lang="en-US" sz="2400" b="0" i="1" smtClean="0">
+                        <a:latin typeface="Cambria Math" panose="02040503050406030204" pitchFamily="18" charset="0"/>
+                      </a:rPr>
+                      <m:t>)</m:t>
+                    </m:r>
+                  </m:oMath>
+                </a14:m>
+                <a:r>
+                  <a:rPr lang="en-US" sz="2400" dirty="0"/>
+                  <a:t> is the filtered signal at time n.</a:t>
+                </a:r>
+              </a:p>
+            </p:txBody>
+          </p:sp>
+        </mc:Choice>
+        <mc:Fallback>
+          <p:sp>
+            <p:nvSpPr>
+              <p:cNvPr id="3" name="Content Placeholder 2">
+                <a:extLst>
+                  <a:ext uri="{FF2B5EF4-FFF2-40B4-BE49-F238E27FC236}">
+                    <a16:creationId xmlns:a16="http://schemas.microsoft.com/office/drawing/2014/main" id="{C38077D7-350F-4B96-8B4C-F2FFA3CBAE33}"/>
+                  </a:ext>
+                </a:extLst>
+              </p:cNvPr>
+              <p:cNvSpPr>
+                <a:spLocks noGrp="1" noRot="1" noChangeAspect="1" noMove="1" noResize="1" noEditPoints="1" noAdjustHandles="1" noChangeArrowheads="1" noChangeShapeType="1" noTextEdit="1"/>
+              </p:cNvSpPr>
+              <p:nvPr>
+                <p:ph idx="1"/>
+              </p:nvPr>
+            </p:nvSpPr>
+            <p:spPr>
+              <a:blipFill>
+                <a:blip r:embed="rId2"/>
+                <a:stretch>
+                  <a:fillRect l="-928" r="-522" b="-3081"/>
+                </a:stretch>
+              </a:blipFill>
+            </p:spPr>
+            <p:txBody>
+              <a:bodyPr/>
+              <a:lstStyle/>
+              <a:p>
+                <a:r>
+                  <a:rPr lang="en-US">
+                    <a:noFill/>
+                  </a:rPr>
+                  <a:t> </a:t>
+                </a:r>
+              </a:p>
+            </p:txBody>
+          </p:sp>
+        </mc:Fallback>
+      </mc:AlternateContent>
+    </p:spTree>
+    <p:extLst>
+      <p:ext uri="{BB962C8B-B14F-4D97-AF65-F5344CB8AC3E}">
+        <p14:creationId xmlns:p14="http://schemas.microsoft.com/office/powerpoint/2010/main" val="789820776"/>
+      </p:ext>
+    </p:extLst>
+  </p:cSld>
+  <p:clrMapOvr>
+    <a:masterClrMapping/>
+  </p:clrMapOvr>
+</p:sld>
+</file>
+
 <file path=ppt/slides/slide2.xml><?xml version="1.0" encoding="utf-8"?>
 <p:sld xmlns:a="http://schemas.openxmlformats.org/drawingml/2006/main" xmlns:r="http://schemas.openxmlformats.org/officeDocument/2006/relationships" xmlns:p="http://schemas.openxmlformats.org/presentationml/2006/main">
   <p:cSld>
@@ -4989,8 +7255,8 @@
           </a:p>
         </p:txBody>
       </p:sp>
-      <mc:AlternateContent xmlns:mc="http://schemas.openxmlformats.org/markup-compatibility/2006">
-        <mc:Choice xmlns:a14="http://schemas.microsoft.com/office/drawing/2010/main" Requires="a14">
+      <mc:AlternateContent xmlns:mc="http://schemas.openxmlformats.org/markup-compatibility/2006" xmlns:a14="http://schemas.microsoft.com/office/drawing/2010/main">
+        <mc:Choice Requires="a14">
           <p:sp>
             <p:nvSpPr>
               <p:cNvPr id="3" name="Content Placeholder 2">
@@ -5419,13 +7685,7 @@
                             <a:rPr lang="en-US" b="0" i="1" smtClean="0">
                               <a:latin typeface="Cambria Math" panose="02040503050406030204" pitchFamily="18" charset="0"/>
                             </a:rPr>
-                            <m:t>+</m:t>
-                          </m:r>
-                          <m:r>
-                            <a:rPr lang="en-US" b="0" i="1" smtClean="0">
-                              <a:latin typeface="Cambria Math" panose="02040503050406030204" pitchFamily="18" charset="0"/>
-                            </a:rPr>
-                            <m:t>10</m:t>
+                            <m:t>+10</m:t>
                           </m:r>
                           <m:r>
                             <a:rPr lang="en-US" b="0" i="1" smtClean="0">
@@ -5510,13 +7770,7 @@
                             <a:rPr lang="en-US" b="0" i="1" smtClean="0">
                               <a:latin typeface="Cambria Math" panose="02040503050406030204" pitchFamily="18" charset="0"/>
                             </a:rPr>
-                            <m:t>+</m:t>
-                          </m:r>
-                          <m:r>
-                            <a:rPr lang="en-US" b="0" i="1" smtClean="0">
-                              <a:latin typeface="Cambria Math" panose="02040503050406030204" pitchFamily="18" charset="0"/>
-                            </a:rPr>
-                            <m:t>100</m:t>
+                            <m:t>+100</m:t>
                           </m:r>
                           <m:sSup>
                             <m:sSupPr>
@@ -5762,13 +8016,7 @@
                             <a:rPr lang="en-US" b="0" i="1" smtClean="0">
                               <a:latin typeface="Cambria Math" panose="02040503050406030204" pitchFamily="18" charset="0"/>
                             </a:rPr>
-                            <m:t>+</m:t>
-                          </m:r>
-                          <m:r>
-                            <a:rPr lang="en-US" b="0" i="1" smtClean="0">
-                              <a:latin typeface="Cambria Math" panose="02040503050406030204" pitchFamily="18" charset="0"/>
-                            </a:rPr>
-                            <m:t>2∗</m:t>
+                            <m:t>+2∗</m:t>
                           </m:r>
                           <m:sSup>
                             <m:sSupPr>
@@ -5944,7 +8192,7 @@
             </p:txBody>
           </p:sp>
         </mc:Choice>
-        <mc:Fallback>
+        <mc:Fallback xmlns="">
           <p:sp>
             <p:nvSpPr>
               <p:cNvPr id="3" name="Content Placeholder 2">
@@ -6042,8 +8290,8 @@
           </a:p>
         </p:txBody>
       </p:sp>
-      <mc:AlternateContent xmlns:mc="http://schemas.openxmlformats.org/markup-compatibility/2006">
-        <mc:Choice xmlns:a14="http://schemas.microsoft.com/office/drawing/2010/main" Requires="a14">
+      <mc:AlternateContent xmlns:mc="http://schemas.openxmlformats.org/markup-compatibility/2006" xmlns:a14="http://schemas.microsoft.com/office/drawing/2010/main">
+        <mc:Choice Requires="a14">
           <p:sp>
             <p:nvSpPr>
               <p:cNvPr id="3" name="Content Placeholder 2">
@@ -6308,13 +8556,7 @@
                                 <a:rPr lang="en-US" sz="1800" b="0" i="1" smtClean="0">
                                   <a:latin typeface="Cambria Math" panose="02040503050406030204" pitchFamily="18" charset="0"/>
                                 </a:rPr>
-                                <m:t>2∗</m:t>
-                              </m:r>
-                              <m:r>
-                                <a:rPr lang="en-US" sz="1800" b="0" i="1" smtClean="0">
-                                  <a:latin typeface="Cambria Math" panose="02040503050406030204" pitchFamily="18" charset="0"/>
-                                </a:rPr>
-                                <m:t>10</m:t>
+                                <m:t>2∗10</m:t>
                               </m:r>
                             </m:e>
                             <m:sup>
@@ -6397,13 +8639,7 @@
                             <a:rPr lang="en-US" sz="1800" b="0" i="1" smtClean="0">
                               <a:latin typeface="Cambria Math" panose="02040503050406030204" pitchFamily="18" charset="0"/>
                             </a:rPr>
-                            <m:t>+</m:t>
-                          </m:r>
-                          <m:r>
-                            <a:rPr lang="en-US" sz="1800" b="0" i="1" smtClean="0">
-                              <a:latin typeface="Cambria Math" panose="02040503050406030204" pitchFamily="18" charset="0"/>
-                            </a:rPr>
-                            <m:t>100</m:t>
+                            <m:t>+100</m:t>
                           </m:r>
                           <m:sSup>
                             <m:sSupPr>
@@ -7503,7 +9739,7 @@
             </p:txBody>
           </p:sp>
         </mc:Choice>
-        <mc:Fallback>
+        <mc:Fallback xmlns="">
           <p:sp>
             <p:nvSpPr>
               <p:cNvPr id="3" name="Content Placeholder 2">
@@ -7601,8 +9837,8 @@
           </a:p>
         </p:txBody>
       </p:sp>
-      <mc:AlternateContent xmlns:mc="http://schemas.openxmlformats.org/markup-compatibility/2006">
-        <mc:Choice xmlns:a14="http://schemas.microsoft.com/office/drawing/2010/main" Requires="a14">
+      <mc:AlternateContent xmlns:mc="http://schemas.openxmlformats.org/markup-compatibility/2006" xmlns:a14="http://schemas.microsoft.com/office/drawing/2010/main">
+        <mc:Choice Requires="a14">
           <p:sp>
             <p:nvSpPr>
               <p:cNvPr id="3" name="Content Placeholder 2">
@@ -8312,7 +10548,7 @@
                       <m:sSup>
                         <m:sSupPr>
                           <m:ctrlPr>
-                            <a:rPr lang="en-US" sz="1800" b="0" i="0" smtClean="0">
+                            <a:rPr lang="en-US" sz="1800" b="0" i="1" smtClean="0">
                               <a:latin typeface="Cambria Math" panose="02040503050406030204" pitchFamily="18" charset="0"/>
                             </a:rPr>
                           </m:ctrlPr>
@@ -8349,7 +10585,7 @@
                       <m:d>
                         <m:dPr>
                           <m:ctrlPr>
-                            <a:rPr lang="en-US" sz="1800" b="0" i="0" smtClean="0">
+                            <a:rPr lang="en-US" sz="1800" b="0" i="1" smtClean="0">
                               <a:latin typeface="Cambria Math" panose="02040503050406030204" pitchFamily="18" charset="0"/>
                             </a:rPr>
                           </m:ctrlPr>
@@ -8375,7 +10611,7 @@
                       <m:sSup>
                         <m:sSupPr>
                           <m:ctrlPr>
-                            <a:rPr lang="en-US" sz="1800" b="0" i="0" smtClean="0">
+                            <a:rPr lang="en-US" sz="1800" b="0" i="1" smtClean="0">
                               <a:latin typeface="Cambria Math" panose="02040503050406030204" pitchFamily="18" charset="0"/>
                             </a:rPr>
                           </m:ctrlPr>
@@ -8412,7 +10648,7 @@
                       <m:d>
                         <m:dPr>
                           <m:ctrlPr>
-                            <a:rPr lang="en-US" sz="1800" b="0" i="0" smtClean="0">
+                            <a:rPr lang="en-US" sz="1800" b="0" i="1" smtClean="0">
                               <a:latin typeface="Cambria Math" panose="02040503050406030204" pitchFamily="18" charset="0"/>
                             </a:rPr>
                           </m:ctrlPr>
@@ -8447,7 +10683,7 @@
                       <m:d>
                         <m:dPr>
                           <m:ctrlPr>
-                            <a:rPr lang="en-US" sz="1800" b="0" i="0" smtClean="0">
+                            <a:rPr lang="en-US" sz="1800" b="0" i="1" smtClean="0">
                               <a:latin typeface="Cambria Math" panose="02040503050406030204" pitchFamily="18" charset="0"/>
                             </a:rPr>
                           </m:ctrlPr>
@@ -8473,7 +10709,7 @@
                       <m:sSup>
                         <m:sSupPr>
                           <m:ctrlPr>
-                            <a:rPr lang="en-US" sz="1800" b="0" i="0" smtClean="0">
+                            <a:rPr lang="en-US" sz="1800" b="0" i="1" smtClean="0">
                               <a:latin typeface="Cambria Math" panose="02040503050406030204" pitchFamily="18" charset="0"/>
                             </a:rPr>
                           </m:ctrlPr>
@@ -8510,7 +10746,7 @@
                       <m:d>
                         <m:dPr>
                           <m:ctrlPr>
-                            <a:rPr lang="en-US" sz="1800" b="0" i="0" smtClean="0">
+                            <a:rPr lang="en-US" sz="1800" b="0" i="1" smtClean="0">
                               <a:latin typeface="Cambria Math" panose="02040503050406030204" pitchFamily="18" charset="0"/>
                             </a:rPr>
                           </m:ctrlPr>
@@ -8536,7 +10772,7 @@
                       <m:sSup>
                         <m:sSupPr>
                           <m:ctrlPr>
-                            <a:rPr lang="en-US" sz="1800" b="0" i="0" smtClean="0">
+                            <a:rPr lang="en-US" sz="1800" b="0" i="1" smtClean="0">
                               <a:latin typeface="Cambria Math" panose="02040503050406030204" pitchFamily="18" charset="0"/>
                             </a:rPr>
                           </m:ctrlPr>
@@ -8640,13 +10876,7 @@
                         <a:rPr lang="en-US" sz="1800" b="0" i="1" smtClean="0">
                           <a:latin typeface="Cambria Math" panose="02040503050406030204" pitchFamily="18" charset="0"/>
                         </a:rPr>
-                        <m:t>)−8103.6946</m:t>
-                      </m:r>
-                      <m:r>
-                        <a:rPr lang="en-US" sz="1800" i="1">
-                          <a:latin typeface="Cambria Math" panose="02040503050406030204" pitchFamily="18" charset="0"/>
-                        </a:rPr>
-                        <m:t>91</m:t>
+                        <m:t>)−8103.694691</m:t>
                       </m:r>
                       <m:r>
                         <m:rPr>
@@ -8676,13 +10906,7 @@
                         <a:rPr lang="en-US" sz="1800" b="0" i="0" smtClean="0">
                           <a:latin typeface="Cambria Math" panose="02040503050406030204" pitchFamily="18" charset="0"/>
                         </a:rPr>
-                        <m:t>−1)+3962.</m:t>
-                      </m:r>
-                      <m:r>
-                        <a:rPr lang="en-US" sz="1800">
-                          <a:latin typeface="Cambria Math" panose="02040503050406030204" pitchFamily="18" charset="0"/>
-                        </a:rPr>
-                        <m:t>815714</m:t>
+                        <m:t>−1)+3962.815714</m:t>
                       </m:r>
                       <m:r>
                         <m:rPr>
@@ -8881,7 +11105,7 @@
                       <m:d>
                         <m:dPr>
                           <m:ctrlPr>
-                            <a:rPr lang="en-US" sz="1800" b="0" i="0" smtClean="0">
+                            <a:rPr lang="en-US" sz="1800" b="0" i="1" smtClean="0">
                               <a:solidFill>
                                 <a:srgbClr val="FF0000"/>
                               </a:solidFill>
@@ -8937,7 +11161,7 @@
                       <m:d>
                         <m:dPr>
                           <m:ctrlPr>
-                            <a:rPr lang="en-US" sz="1800" b="0" i="0" smtClean="0">
+                            <a:rPr lang="en-US" sz="1800" b="0" i="1" smtClean="0">
                               <a:solidFill>
                                 <a:srgbClr val="FF0000"/>
                               </a:solidFill>
@@ -8993,7 +11217,7 @@
                       <m:d>
                         <m:dPr>
                           <m:ctrlPr>
-                            <a:rPr lang="en-US" sz="1800" b="0" i="0" smtClean="0">
+                            <a:rPr lang="en-US" sz="1800" b="0" i="1" smtClean="0">
                               <a:solidFill>
                                 <a:srgbClr val="FF0000"/>
                               </a:solidFill>
@@ -9040,7 +11264,7 @@
                       <m:d>
                         <m:dPr>
                           <m:ctrlPr>
-                            <a:rPr lang="en-US" sz="1800" b="0" i="0" smtClean="0">
+                            <a:rPr lang="en-US" sz="1800" b="0" i="1" smtClean="0">
                               <a:solidFill>
                                 <a:srgbClr val="FF0000"/>
                               </a:solidFill>
@@ -9217,7 +11441,7 @@
             </p:txBody>
           </p:sp>
         </mc:Choice>
-        <mc:Fallback>
+        <mc:Fallback xmlns="">
           <p:sp>
             <p:nvSpPr>
               <p:cNvPr id="3" name="Content Placeholder 2">

</xml_diff>